<commit_message>
Update to the Lab1 files of IPSP
</commit_message>
<xml_diff>
--- a/training/IPSP/Lab1/LabBook_010.pptx
+++ b/training/IPSP/Lab1/LabBook_010.pptx
@@ -5,10 +5,10 @@
     <p:sldMasterId id="2147483648" r:id="rId1"/>
   </p:sldMasterIdLst>
   <p:notesMasterIdLst>
-    <p:notesMasterId r:id="rId8"/>
+    <p:notesMasterId r:id="rId10"/>
   </p:notesMasterIdLst>
   <p:handoutMasterIdLst>
-    <p:handoutMasterId r:id="rId9"/>
+    <p:handoutMasterId r:id="rId11"/>
   </p:handoutMasterIdLst>
   <p:sldIdLst>
     <p:sldId id="256" r:id="rId2"/>
@@ -16,7 +16,9 @@
     <p:sldId id="290" r:id="rId4"/>
     <p:sldId id="291" r:id="rId5"/>
     <p:sldId id="292" r:id="rId6"/>
-    <p:sldId id="288" r:id="rId7"/>
+    <p:sldId id="297" r:id="rId7"/>
+    <p:sldId id="293" r:id="rId8"/>
+    <p:sldId id="288" r:id="rId9"/>
   </p:sldIdLst>
   <p:sldSz cx="12192000" cy="6858000"/>
   <p:notesSz cx="12192000" cy="6858000"/>
@@ -1280,7 +1282,7 @@
           <a:p>
             <a:fld id="{8438F8DC-35B0-48E6-A86E-42F1F08DD00F}" type="datetimeFigureOut">
               <a:rPr lang="es-ES" smtClean="0"/>
-              <a:t>29/01/2025</a:t>
+              <a:t>01/10/2025</a:t>
             </a:fld>
             <a:endParaRPr lang="es-ES"/>
           </a:p>
@@ -1457,7 +1459,7 @@
           <a:p>
             <a:fld id="{FACBDC12-F39B-4B97-8F4D-6734F9D366FF}" type="datetimeFigureOut">
               <a:rPr lang="es-ES" smtClean="0"/>
-              <a:t>29/01/2025</a:t>
+              <a:t>01/10/2025</a:t>
             </a:fld>
             <a:endParaRPr lang="es-ES"/>
           </a:p>
@@ -2015,6 +2017,222 @@
     <p:extLst>
       <p:ext uri="{BB962C8B-B14F-4D97-AF65-F5344CB8AC3E}">
         <p14:creationId xmlns:p14="http://schemas.microsoft.com/office/powerpoint/2010/main" val="4116079046"/>
+      </p:ext>
+    </p:extLst>
+  </p:cSld>
+  <p:clrMapOvr>
+    <a:masterClrMapping/>
+  </p:clrMapOvr>
+</p:notes>
+</file>
+
+<file path=ppt/notesSlides/notesSlide4.xml><?xml version="1.0" encoding="utf-8"?>
+<p:notes xmlns:a="http://schemas.openxmlformats.org/drawingml/2006/main" xmlns:r="http://schemas.openxmlformats.org/officeDocument/2006/relationships" xmlns:p="http://schemas.openxmlformats.org/presentationml/2006/main">
+  <p:cSld>
+    <p:spTree>
+      <p:nvGrpSpPr>
+        <p:cNvPr id="1" name="">
+          <a:extLst>
+            <a:ext uri="{FF2B5EF4-FFF2-40B4-BE49-F238E27FC236}">
+              <a16:creationId xmlns:a16="http://schemas.microsoft.com/office/drawing/2014/main" id="{7A69AA65-166B-474B-A6C9-9858D86A9448}"/>
+            </a:ext>
+          </a:extLst>
+        </p:cNvPr>
+        <p:cNvGrpSpPr/>
+        <p:nvPr/>
+      </p:nvGrpSpPr>
+      <p:grpSpPr>
+        <a:xfrm>
+          <a:off x="0" y="0"/>
+          <a:ext cx="0" cy="0"/>
+          <a:chOff x="0" y="0"/>
+          <a:chExt cx="0" cy="0"/>
+        </a:xfrm>
+      </p:grpSpPr>
+      <p:sp>
+        <p:nvSpPr>
+          <p:cNvPr id="2" name="Marcador de imagen de diapositiva 1">
+            <a:extLst>
+              <a:ext uri="{FF2B5EF4-FFF2-40B4-BE49-F238E27FC236}">
+                <a16:creationId xmlns:a16="http://schemas.microsoft.com/office/drawing/2014/main" id="{38158223-A8BA-05F6-464C-EC03A9FB8C56}"/>
+              </a:ext>
+            </a:extLst>
+          </p:cNvPr>
+          <p:cNvSpPr>
+            <a:spLocks noGrp="1" noRot="1" noChangeAspect="1"/>
+          </p:cNvSpPr>
+          <p:nvPr>
+            <p:ph type="sldImg"/>
+          </p:nvPr>
+        </p:nvSpPr>
+        <p:spPr/>
+      </p:sp>
+      <p:sp>
+        <p:nvSpPr>
+          <p:cNvPr id="3" name="Marcador de notas 2">
+            <a:extLst>
+              <a:ext uri="{FF2B5EF4-FFF2-40B4-BE49-F238E27FC236}">
+                <a16:creationId xmlns:a16="http://schemas.microsoft.com/office/drawing/2014/main" id="{F6ECB4DF-C329-8F47-9ECE-661B5B2BF9AC}"/>
+              </a:ext>
+            </a:extLst>
+          </p:cNvPr>
+          <p:cNvSpPr>
+            <a:spLocks noGrp="1"/>
+          </p:cNvSpPr>
+          <p:nvPr>
+            <p:ph type="body" idx="1"/>
+          </p:nvPr>
+        </p:nvSpPr>
+        <p:spPr/>
+        <p:txBody>
+          <a:bodyPr/>
+          <a:lstStyle/>
+          <a:p>
+            <a:endParaRPr lang="es-ES" dirty="0"/>
+          </a:p>
+        </p:txBody>
+      </p:sp>
+      <p:sp>
+        <p:nvSpPr>
+          <p:cNvPr id="4" name="Marcador de número de diapositiva 3">
+            <a:extLst>
+              <a:ext uri="{FF2B5EF4-FFF2-40B4-BE49-F238E27FC236}">
+                <a16:creationId xmlns:a16="http://schemas.microsoft.com/office/drawing/2014/main" id="{041B2276-A4E2-DFBF-0088-6997E86C9FE1}"/>
+              </a:ext>
+            </a:extLst>
+          </p:cNvPr>
+          <p:cNvSpPr>
+            <a:spLocks noGrp="1"/>
+          </p:cNvSpPr>
+          <p:nvPr>
+            <p:ph type="sldNum" sz="quarter" idx="5"/>
+          </p:nvPr>
+        </p:nvSpPr>
+        <p:spPr/>
+        <p:txBody>
+          <a:bodyPr/>
+          <a:lstStyle/>
+          <a:p>
+            <a:fld id="{676223B9-C868-4436-87D9-1A3152E1157A}" type="slidenum">
+              <a:rPr lang="es-ES" smtClean="0"/>
+              <a:t>6</a:t>
+            </a:fld>
+            <a:endParaRPr lang="es-ES"/>
+          </a:p>
+        </p:txBody>
+      </p:sp>
+    </p:spTree>
+    <p:extLst>
+      <p:ext uri="{BB962C8B-B14F-4D97-AF65-F5344CB8AC3E}">
+        <p14:creationId xmlns:p14="http://schemas.microsoft.com/office/powerpoint/2010/main" val="2362315989"/>
+      </p:ext>
+    </p:extLst>
+  </p:cSld>
+  <p:clrMapOvr>
+    <a:masterClrMapping/>
+  </p:clrMapOvr>
+</p:notes>
+</file>
+
+<file path=ppt/notesSlides/notesSlide5.xml><?xml version="1.0" encoding="utf-8"?>
+<p:notes xmlns:a="http://schemas.openxmlformats.org/drawingml/2006/main" xmlns:r="http://schemas.openxmlformats.org/officeDocument/2006/relationships" xmlns:p="http://schemas.openxmlformats.org/presentationml/2006/main">
+  <p:cSld>
+    <p:spTree>
+      <p:nvGrpSpPr>
+        <p:cNvPr id="1" name="">
+          <a:extLst>
+            <a:ext uri="{FF2B5EF4-FFF2-40B4-BE49-F238E27FC236}">
+              <a16:creationId xmlns:a16="http://schemas.microsoft.com/office/drawing/2014/main" id="{7B023B86-D15F-9CD8-C5EA-3EAAD8BACCF7}"/>
+            </a:ext>
+          </a:extLst>
+        </p:cNvPr>
+        <p:cNvGrpSpPr/>
+        <p:nvPr/>
+      </p:nvGrpSpPr>
+      <p:grpSpPr>
+        <a:xfrm>
+          <a:off x="0" y="0"/>
+          <a:ext cx="0" cy="0"/>
+          <a:chOff x="0" y="0"/>
+          <a:chExt cx="0" cy="0"/>
+        </a:xfrm>
+      </p:grpSpPr>
+      <p:sp>
+        <p:nvSpPr>
+          <p:cNvPr id="2" name="Marcador de imagen de diapositiva 1">
+            <a:extLst>
+              <a:ext uri="{FF2B5EF4-FFF2-40B4-BE49-F238E27FC236}">
+                <a16:creationId xmlns:a16="http://schemas.microsoft.com/office/drawing/2014/main" id="{5C73881A-26A5-ECF9-C6F2-3DEFA77AEFCC}"/>
+              </a:ext>
+            </a:extLst>
+          </p:cNvPr>
+          <p:cNvSpPr>
+            <a:spLocks noGrp="1" noRot="1" noChangeAspect="1"/>
+          </p:cNvSpPr>
+          <p:nvPr>
+            <p:ph type="sldImg"/>
+          </p:nvPr>
+        </p:nvSpPr>
+        <p:spPr/>
+      </p:sp>
+      <p:sp>
+        <p:nvSpPr>
+          <p:cNvPr id="3" name="Marcador de notas 2">
+            <a:extLst>
+              <a:ext uri="{FF2B5EF4-FFF2-40B4-BE49-F238E27FC236}">
+                <a16:creationId xmlns:a16="http://schemas.microsoft.com/office/drawing/2014/main" id="{3B7AFC79-4973-3930-959B-AEF8810CFE6A}"/>
+              </a:ext>
+            </a:extLst>
+          </p:cNvPr>
+          <p:cNvSpPr>
+            <a:spLocks noGrp="1"/>
+          </p:cNvSpPr>
+          <p:nvPr>
+            <p:ph type="body" idx="1"/>
+          </p:nvPr>
+        </p:nvSpPr>
+        <p:spPr/>
+        <p:txBody>
+          <a:bodyPr/>
+          <a:lstStyle/>
+          <a:p>
+            <a:endParaRPr lang="es-ES" dirty="0"/>
+          </a:p>
+        </p:txBody>
+      </p:sp>
+      <p:sp>
+        <p:nvSpPr>
+          <p:cNvPr id="4" name="Marcador de número de diapositiva 3">
+            <a:extLst>
+              <a:ext uri="{FF2B5EF4-FFF2-40B4-BE49-F238E27FC236}">
+                <a16:creationId xmlns:a16="http://schemas.microsoft.com/office/drawing/2014/main" id="{8345D0F3-6273-0338-FCDA-175B73D7C9EB}"/>
+              </a:ext>
+            </a:extLst>
+          </p:cNvPr>
+          <p:cNvSpPr>
+            <a:spLocks noGrp="1"/>
+          </p:cNvSpPr>
+          <p:nvPr>
+            <p:ph type="sldNum" sz="quarter" idx="5"/>
+          </p:nvPr>
+        </p:nvSpPr>
+        <p:spPr/>
+        <p:txBody>
+          <a:bodyPr/>
+          <a:lstStyle/>
+          <a:p>
+            <a:fld id="{676223B9-C868-4436-87D9-1A3152E1157A}" type="slidenum">
+              <a:rPr lang="es-ES" smtClean="0"/>
+              <a:t>7</a:t>
+            </a:fld>
+            <a:endParaRPr lang="es-ES"/>
+          </a:p>
+        </p:txBody>
+      </p:sp>
+    </p:spTree>
+    <p:extLst>
+      <p:ext uri="{BB962C8B-B14F-4D97-AF65-F5344CB8AC3E}">
+        <p14:creationId xmlns:p14="http://schemas.microsoft.com/office/powerpoint/2010/main" val="2917382716"/>
       </p:ext>
     </p:extLst>
   </p:cSld>
@@ -3484,14 +3702,14 @@
                 <a:latin typeface="Lucida Sans"/>
                 <a:cs typeface="Lucida Sans"/>
               </a:rPr>
-              <a:t> Book 0.1. </a:t>
+              <a:t> Book 1. </a:t>
             </a:r>
             <a:r>
               <a:rPr lang="es-ES" sz="3200" b="1" dirty="0" err="1">
                 <a:latin typeface="Lucida Sans"/>
                 <a:cs typeface="Lucida Sans"/>
               </a:rPr>
-              <a:t>ModeSolver</a:t>
+              <a:t>Waveguides</a:t>
             </a:r>
             <a:endParaRPr sz="3200" dirty="0">
               <a:latin typeface="Lucida Sans"/>
@@ -7847,6 +8065,2109 @@
   <p:cSld>
     <p:spTree>
       <p:nvGrpSpPr>
+        <p:cNvPr id="1" name="">
+          <a:extLst>
+            <a:ext uri="{FF2B5EF4-FFF2-40B4-BE49-F238E27FC236}">
+              <a16:creationId xmlns:a16="http://schemas.microsoft.com/office/drawing/2014/main" id="{9E1DA0F9-B230-D9FC-3CE7-03BD08CF54F7}"/>
+            </a:ext>
+          </a:extLst>
+        </p:cNvPr>
+        <p:cNvGrpSpPr/>
+        <p:nvPr/>
+      </p:nvGrpSpPr>
+      <p:grpSpPr>
+        <a:xfrm>
+          <a:off x="0" y="0"/>
+          <a:ext cx="0" cy="0"/>
+          <a:chOff x="0" y="0"/>
+          <a:chExt cx="0" cy="0"/>
+        </a:xfrm>
+      </p:grpSpPr>
+      <mc:AlternateContent xmlns:mc="http://schemas.openxmlformats.org/markup-compatibility/2006" xmlns:a14="http://schemas.microsoft.com/office/drawing/2010/main">
+        <mc:Choice Requires="a14">
+          <p:sp>
+            <p:nvSpPr>
+              <p:cNvPr id="16" name="object 16">
+                <a:extLst>
+                  <a:ext uri="{FF2B5EF4-FFF2-40B4-BE49-F238E27FC236}">
+                    <a16:creationId xmlns:a16="http://schemas.microsoft.com/office/drawing/2014/main" id="{394400B4-EE16-8E85-AB54-E82FE3B29345}"/>
+                  </a:ext>
+                </a:extLst>
+              </p:cNvPr>
+              <p:cNvSpPr txBox="1">
+                <a:spLocks noGrp="1"/>
+              </p:cNvSpPr>
+              <p:nvPr>
+                <p:ph type="title"/>
+              </p:nvPr>
+            </p:nvSpPr>
+            <p:spPr>
+              <a:xfrm>
+                <a:off x="685800" y="408883"/>
+                <a:ext cx="10994410" cy="1071255"/>
+              </a:xfrm>
+              <a:prstGeom prst="rect">
+                <a:avLst/>
+              </a:prstGeom>
+            </p:spPr>
+            <p:txBody>
+              <a:bodyPr vert="horz" wrap="square" lIns="0" tIns="12700" rIns="0" bIns="0" rtlCol="0">
+                <a:spAutoFit/>
+              </a:bodyPr>
+              <a:lstStyle/>
+              <a:p>
+                <a:pPr marL="12700">
+                  <a:lnSpc>
+                    <a:spcPct val="100000"/>
+                  </a:lnSpc>
+                  <a:spcBef>
+                    <a:spcPts val="100"/>
+                  </a:spcBef>
+                </a:pPr>
+                <a:r>
+                  <a:rPr lang="en-US" sz="2500" dirty="0"/>
+                  <a:t>Learning outcome #4 – Waveguide compact model</a:t>
+                </a:r>
+                <a:br>
+                  <a:rPr lang="en-US" sz="2500" spc="-5" dirty="0">
+                    <a:latin typeface="+mj-lt"/>
+                    <a:cs typeface="Lucida Sans"/>
+                  </a:rPr>
+                </a:br>
+                <a:r>
+                  <a:rPr lang="en-US" b="0" dirty="0"/>
+                  <a:t>Let’s model the waveguide using a second order polynomial: </a:t>
+                </a:r>
+                <a:br>
+                  <a:rPr lang="en-US" b="0" dirty="0"/>
+                </a:br>
+                <a14:m>
+                  <m:oMathPara xmlns:m="http://schemas.openxmlformats.org/officeDocument/2006/math">
+                    <m:oMathParaPr>
+                      <m:jc m:val="centerGroup"/>
+                    </m:oMathParaPr>
+                    <m:oMath xmlns:m="http://schemas.openxmlformats.org/officeDocument/2006/math">
+                      <m:sSub>
+                        <m:sSubPr>
+                          <m:ctrlPr>
+                            <a:rPr lang="es-ES" b="0" i="1" smtClean="0">
+                              <a:latin typeface="Cambria Math" panose="02040503050406030204" pitchFamily="18" charset="0"/>
+                            </a:rPr>
+                          </m:ctrlPr>
+                        </m:sSubPr>
+                        <m:e>
+                          <m:r>
+                            <a:rPr lang="es-ES" b="0" i="1" smtClean="0">
+                              <a:latin typeface="Cambria Math" panose="02040503050406030204" pitchFamily="18" charset="0"/>
+                            </a:rPr>
+                            <m:t>𝑛</m:t>
+                          </m:r>
+                        </m:e>
+                        <m:sub>
+                          <m:r>
+                            <a:rPr lang="es-ES" b="0" i="1" smtClean="0">
+                              <a:latin typeface="Cambria Math" panose="02040503050406030204" pitchFamily="18" charset="0"/>
+                            </a:rPr>
+                            <m:t>𝑒𝑓𝑓</m:t>
+                          </m:r>
+                        </m:sub>
+                      </m:sSub>
+                      <m:d>
+                        <m:dPr>
+                          <m:ctrlPr>
+                            <a:rPr lang="es-ES" b="0" i="1" smtClean="0">
+                              <a:latin typeface="Cambria Math" panose="02040503050406030204" pitchFamily="18" charset="0"/>
+                            </a:rPr>
+                          </m:ctrlPr>
+                        </m:dPr>
+                        <m:e>
+                          <m:r>
+                            <a:rPr lang="es-ES" b="0" i="1" smtClean="0">
+                              <a:latin typeface="Cambria Math" panose="02040503050406030204" pitchFamily="18" charset="0"/>
+                            </a:rPr>
+                            <m:t>𝜆</m:t>
+                          </m:r>
+                        </m:e>
+                      </m:d>
+                      <m:r>
+                        <a:rPr lang="es-ES" b="0" i="1" smtClean="0">
+                          <a:latin typeface="Cambria Math" panose="02040503050406030204" pitchFamily="18" charset="0"/>
+                        </a:rPr>
+                        <m:t>=</m:t>
+                      </m:r>
+                      <m:sSub>
+                        <m:sSubPr>
+                          <m:ctrlPr>
+                            <a:rPr lang="es-ES" b="0" i="1" smtClean="0">
+                              <a:latin typeface="Cambria Math" panose="02040503050406030204" pitchFamily="18" charset="0"/>
+                            </a:rPr>
+                          </m:ctrlPr>
+                        </m:sSubPr>
+                        <m:e>
+                          <m:r>
+                            <a:rPr lang="es-ES" b="0" i="1" smtClean="0">
+                              <a:latin typeface="Cambria Math" panose="02040503050406030204" pitchFamily="18" charset="0"/>
+                            </a:rPr>
+                            <m:t>𝑛</m:t>
+                          </m:r>
+                        </m:e>
+                        <m:sub>
+                          <m:r>
+                            <a:rPr lang="es-ES" b="0" i="1" smtClean="0">
+                              <a:latin typeface="Cambria Math" panose="02040503050406030204" pitchFamily="18" charset="0"/>
+                            </a:rPr>
+                            <m:t>1</m:t>
+                          </m:r>
+                        </m:sub>
+                      </m:sSub>
+                      <m:r>
+                        <a:rPr lang="es-ES" b="0" i="1" smtClean="0">
+                          <a:latin typeface="Cambria Math" panose="02040503050406030204" pitchFamily="18" charset="0"/>
+                        </a:rPr>
+                        <m:t>+</m:t>
+                      </m:r>
+                      <m:sSub>
+                        <m:sSubPr>
+                          <m:ctrlPr>
+                            <a:rPr lang="es-ES" b="0" i="1" smtClean="0">
+                              <a:latin typeface="Cambria Math" panose="02040503050406030204" pitchFamily="18" charset="0"/>
+                            </a:rPr>
+                          </m:ctrlPr>
+                        </m:sSubPr>
+                        <m:e>
+                          <m:r>
+                            <a:rPr lang="es-ES" b="0" i="1" smtClean="0">
+                              <a:latin typeface="Cambria Math" panose="02040503050406030204" pitchFamily="18" charset="0"/>
+                            </a:rPr>
+                            <m:t>𝑛</m:t>
+                          </m:r>
+                        </m:e>
+                        <m:sub>
+                          <m:r>
+                            <a:rPr lang="es-ES" b="0" i="1" smtClean="0">
+                              <a:latin typeface="Cambria Math" panose="02040503050406030204" pitchFamily="18" charset="0"/>
+                            </a:rPr>
+                            <m:t>2</m:t>
+                          </m:r>
+                        </m:sub>
+                      </m:sSub>
+                      <m:d>
+                        <m:dPr>
+                          <m:ctrlPr>
+                            <a:rPr lang="es-ES" b="0" i="1" smtClean="0">
+                              <a:latin typeface="Cambria Math" panose="02040503050406030204" pitchFamily="18" charset="0"/>
+                            </a:rPr>
+                          </m:ctrlPr>
+                        </m:dPr>
+                        <m:e>
+                          <m:r>
+                            <a:rPr lang="es-ES" b="0" i="1" smtClean="0">
+                              <a:latin typeface="Cambria Math" panose="02040503050406030204" pitchFamily="18" charset="0"/>
+                            </a:rPr>
+                            <m:t>𝜆</m:t>
+                          </m:r>
+                          <m:r>
+                            <a:rPr lang="es-ES" b="0" i="1" smtClean="0">
+                              <a:latin typeface="Cambria Math" panose="02040503050406030204" pitchFamily="18" charset="0"/>
+                            </a:rPr>
+                            <m:t>−</m:t>
+                          </m:r>
+                          <m:sSub>
+                            <m:sSubPr>
+                              <m:ctrlPr>
+                                <a:rPr lang="es-ES" b="0" i="1" smtClean="0">
+                                  <a:latin typeface="Cambria Math" panose="02040503050406030204" pitchFamily="18" charset="0"/>
+                                </a:rPr>
+                              </m:ctrlPr>
+                            </m:sSubPr>
+                            <m:e>
+                              <m:r>
+                                <a:rPr lang="es-ES" b="0" i="1" smtClean="0">
+                                  <a:latin typeface="Cambria Math" panose="02040503050406030204" pitchFamily="18" charset="0"/>
+                                </a:rPr>
+                                <m:t>𝜆</m:t>
+                              </m:r>
+                            </m:e>
+                            <m:sub>
+                              <m:r>
+                                <a:rPr lang="es-ES" b="0" i="1" smtClean="0">
+                                  <a:latin typeface="Cambria Math" panose="02040503050406030204" pitchFamily="18" charset="0"/>
+                                </a:rPr>
+                                <m:t>0</m:t>
+                              </m:r>
+                            </m:sub>
+                          </m:sSub>
+                        </m:e>
+                      </m:d>
+                      <m:r>
+                        <a:rPr lang="es-ES" b="0" i="1" smtClean="0">
+                          <a:latin typeface="Cambria Math" panose="02040503050406030204" pitchFamily="18" charset="0"/>
+                        </a:rPr>
+                        <m:t>+</m:t>
+                      </m:r>
+                      <m:sSub>
+                        <m:sSubPr>
+                          <m:ctrlPr>
+                            <a:rPr lang="es-ES" b="0" i="1" smtClean="0">
+                              <a:latin typeface="Cambria Math" panose="02040503050406030204" pitchFamily="18" charset="0"/>
+                            </a:rPr>
+                          </m:ctrlPr>
+                        </m:sSubPr>
+                        <m:e>
+                          <m:r>
+                            <a:rPr lang="es-ES" b="0" i="1" smtClean="0">
+                              <a:latin typeface="Cambria Math" panose="02040503050406030204" pitchFamily="18" charset="0"/>
+                            </a:rPr>
+                            <m:t>𝑛</m:t>
+                          </m:r>
+                        </m:e>
+                        <m:sub>
+                          <m:r>
+                            <a:rPr lang="es-ES" b="0" i="1" smtClean="0">
+                              <a:latin typeface="Cambria Math" panose="02040503050406030204" pitchFamily="18" charset="0"/>
+                            </a:rPr>
+                            <m:t>3</m:t>
+                          </m:r>
+                        </m:sub>
+                      </m:sSub>
+                      <m:sSup>
+                        <m:sSupPr>
+                          <m:ctrlPr>
+                            <a:rPr lang="es-ES" b="0" i="1" smtClean="0">
+                              <a:latin typeface="Cambria Math" panose="02040503050406030204" pitchFamily="18" charset="0"/>
+                            </a:rPr>
+                          </m:ctrlPr>
+                        </m:sSupPr>
+                        <m:e>
+                          <m:d>
+                            <m:dPr>
+                              <m:ctrlPr>
+                                <a:rPr lang="es-ES" b="0" i="1" smtClean="0">
+                                  <a:latin typeface="Cambria Math" panose="02040503050406030204" pitchFamily="18" charset="0"/>
+                                </a:rPr>
+                              </m:ctrlPr>
+                            </m:dPr>
+                            <m:e>
+                              <m:r>
+                                <a:rPr lang="es-ES" b="0" i="1" smtClean="0">
+                                  <a:latin typeface="Cambria Math" panose="02040503050406030204" pitchFamily="18" charset="0"/>
+                                </a:rPr>
+                                <m:t>𝜆</m:t>
+                              </m:r>
+                              <m:r>
+                                <a:rPr lang="es-ES" b="0" i="1" smtClean="0">
+                                  <a:latin typeface="Cambria Math" panose="02040503050406030204" pitchFamily="18" charset="0"/>
+                                </a:rPr>
+                                <m:t>−</m:t>
+                              </m:r>
+                              <m:sSub>
+                                <m:sSubPr>
+                                  <m:ctrlPr>
+                                    <a:rPr lang="es-ES" b="0" i="1" smtClean="0">
+                                      <a:latin typeface="Cambria Math" panose="02040503050406030204" pitchFamily="18" charset="0"/>
+                                    </a:rPr>
+                                  </m:ctrlPr>
+                                </m:sSubPr>
+                                <m:e>
+                                  <m:r>
+                                    <a:rPr lang="es-ES" b="0" i="1" smtClean="0">
+                                      <a:latin typeface="Cambria Math" panose="02040503050406030204" pitchFamily="18" charset="0"/>
+                                    </a:rPr>
+                                    <m:t>𝜆</m:t>
+                                  </m:r>
+                                </m:e>
+                                <m:sub>
+                                  <m:r>
+                                    <a:rPr lang="es-ES" b="0" i="1" smtClean="0">
+                                      <a:latin typeface="Cambria Math" panose="02040503050406030204" pitchFamily="18" charset="0"/>
+                                    </a:rPr>
+                                    <m:t>0</m:t>
+                                  </m:r>
+                                </m:sub>
+                              </m:sSub>
+                            </m:e>
+                          </m:d>
+                        </m:e>
+                        <m:sup>
+                          <m:r>
+                            <a:rPr lang="es-ES" b="0" i="1" smtClean="0">
+                              <a:latin typeface="Cambria Math" panose="02040503050406030204" pitchFamily="18" charset="0"/>
+                            </a:rPr>
+                            <m:t>2</m:t>
+                          </m:r>
+                        </m:sup>
+                      </m:sSup>
+                    </m:oMath>
+                  </m:oMathPara>
+                </a14:m>
+                <a:br>
+                  <a:rPr lang="en-US" b="0" dirty="0"/>
+                </a:br>
+                <a:endParaRPr lang="en-US" sz="2500" b="0" dirty="0">
+                  <a:latin typeface="+mj-lt"/>
+                  <a:cs typeface="Lucida Sans"/>
+                </a:endParaRPr>
+              </a:p>
+            </p:txBody>
+          </p:sp>
+        </mc:Choice>
+        <mc:Fallback xmlns="">
+          <p:sp>
+            <p:nvSpPr>
+              <p:cNvPr id="16" name="object 16">
+                <a:extLst>
+                  <a:ext uri="{FF2B5EF4-FFF2-40B4-BE49-F238E27FC236}">
+                    <a16:creationId xmlns:a16="http://schemas.microsoft.com/office/drawing/2014/main" id="{394400B4-EE16-8E85-AB54-E82FE3B29345}"/>
+                  </a:ext>
+                </a:extLst>
+              </p:cNvPr>
+              <p:cNvSpPr txBox="1">
+                <a:spLocks noGrp="1" noRot="1" noChangeAspect="1" noMove="1" noResize="1" noEditPoints="1" noAdjustHandles="1" noChangeArrowheads="1" noChangeShapeType="1" noTextEdit="1"/>
+              </p:cNvSpPr>
+              <p:nvPr>
+                <p:ph type="title"/>
+              </p:nvPr>
+            </p:nvSpPr>
+            <p:spPr>
+              <a:xfrm>
+                <a:off x="685800" y="408883"/>
+                <a:ext cx="10994410" cy="1071255"/>
+              </a:xfrm>
+              <a:prstGeom prst="rect">
+                <a:avLst/>
+              </a:prstGeom>
+              <a:blipFill>
+                <a:blip r:embed="rId3"/>
+                <a:stretch>
+                  <a:fillRect l="-1664" t="-7386" b="-4545"/>
+                </a:stretch>
+              </a:blipFill>
+            </p:spPr>
+            <p:txBody>
+              <a:bodyPr/>
+              <a:lstStyle/>
+              <a:p>
+                <a:r>
+                  <a:rPr lang="es-ES">
+                    <a:noFill/>
+                  </a:rPr>
+                  <a:t> </a:t>
+                </a:r>
+              </a:p>
+            </p:txBody>
+          </p:sp>
+        </mc:Fallback>
+      </mc:AlternateContent>
+      <p:pic>
+        <p:nvPicPr>
+          <p:cNvPr id="83" name="Gráfico 82">
+            <a:extLst>
+              <a:ext uri="{FF2B5EF4-FFF2-40B4-BE49-F238E27FC236}">
+                <a16:creationId xmlns:a16="http://schemas.microsoft.com/office/drawing/2014/main" id="{4D53B68D-17ED-7EFB-F2B4-10DA7A772E17}"/>
+              </a:ext>
+            </a:extLst>
+          </p:cNvPr>
+          <p:cNvPicPr>
+            <a:picLocks noChangeAspect="1"/>
+          </p:cNvPicPr>
+          <p:nvPr/>
+        </p:nvPicPr>
+        <p:blipFill>
+          <a:blip r:embed="rId4">
+            <a:extLst>
+              <a:ext uri="{96DAC541-7B7A-43D3-8B79-37D633B846F1}">
+                <asvg:svgBlip xmlns:asvg="http://schemas.microsoft.com/office/drawing/2016/SVG/main" r:embed="rId5"/>
+              </a:ext>
+            </a:extLst>
+          </a:blip>
+          <a:stretch>
+            <a:fillRect/>
+          </a:stretch>
+        </p:blipFill>
+        <p:spPr>
+          <a:xfrm>
+            <a:off x="5045006" y="6356057"/>
+            <a:ext cx="6409575" cy="363174"/>
+          </a:xfrm>
+          <a:prstGeom prst="rect">
+            <a:avLst/>
+          </a:prstGeom>
+        </p:spPr>
+      </p:pic>
+      <p:sp>
+        <p:nvSpPr>
+          <p:cNvPr id="84" name="Marcador de número de diapositiva 83">
+            <a:extLst>
+              <a:ext uri="{FF2B5EF4-FFF2-40B4-BE49-F238E27FC236}">
+                <a16:creationId xmlns:a16="http://schemas.microsoft.com/office/drawing/2014/main" id="{09AB8697-C1EE-6E9A-6550-ACA2C3AE6630}"/>
+              </a:ext>
+            </a:extLst>
+          </p:cNvPr>
+          <p:cNvSpPr>
+            <a:spLocks noGrp="1"/>
+          </p:cNvSpPr>
+          <p:nvPr>
+            <p:ph type="sldNum" sz="quarter" idx="7"/>
+          </p:nvPr>
+        </p:nvSpPr>
+        <p:spPr/>
+        <p:txBody>
+          <a:bodyPr/>
+          <a:lstStyle/>
+          <a:p>
+            <a:fld id="{B6F15528-21DE-4FAA-801E-634DDDAF4B2B}" type="slidenum">
+              <a:rPr lang="es-ES" smtClean="0"/>
+              <a:t>6</a:t>
+            </a:fld>
+            <a:endParaRPr lang="es-ES"/>
+          </a:p>
+        </p:txBody>
+      </p:sp>
+      <p:sp>
+        <p:nvSpPr>
+          <p:cNvPr id="3" name="Marcador de pie de página 2">
+            <a:extLst>
+              <a:ext uri="{FF2B5EF4-FFF2-40B4-BE49-F238E27FC236}">
+                <a16:creationId xmlns:a16="http://schemas.microsoft.com/office/drawing/2014/main" id="{970D4A6C-5B37-EDF5-6242-74B16127E96B}"/>
+              </a:ext>
+            </a:extLst>
+          </p:cNvPr>
+          <p:cNvSpPr>
+            <a:spLocks noGrp="1"/>
+          </p:cNvSpPr>
+          <p:nvPr>
+            <p:ph type="ftr" sz="quarter" idx="5"/>
+          </p:nvPr>
+        </p:nvSpPr>
+        <p:spPr/>
+        <p:txBody>
+          <a:bodyPr/>
+          <a:lstStyle/>
+          <a:p>
+            <a:pPr marL="12700">
+              <a:spcBef>
+                <a:spcPts val="15"/>
+              </a:spcBef>
+            </a:pPr>
+            <a:r>
+              <a:rPr lang="es-ES" spc="-5"/>
+              <a:t>LAB 1.0. WAVEGUIDES</a:t>
+            </a:r>
+            <a:endParaRPr lang="es-ES" spc="-5" dirty="0"/>
+          </a:p>
+        </p:txBody>
+      </p:sp>
+      <mc:AlternateContent xmlns:mc="http://schemas.openxmlformats.org/markup-compatibility/2006" xmlns:a14="http://schemas.microsoft.com/office/drawing/2010/main">
+        <mc:Choice Requires="a14">
+          <p:sp>
+            <p:nvSpPr>
+              <p:cNvPr id="2" name="CuadroTexto 1">
+                <a:extLst>
+                  <a:ext uri="{FF2B5EF4-FFF2-40B4-BE49-F238E27FC236}">
+                    <a16:creationId xmlns:a16="http://schemas.microsoft.com/office/drawing/2014/main" id="{A440F587-93A3-E474-C0B0-883BB9DAFD85}"/>
+                  </a:ext>
+                </a:extLst>
+              </p:cNvPr>
+              <p:cNvSpPr txBox="1"/>
+              <p:nvPr/>
+            </p:nvSpPr>
+            <p:spPr>
+              <a:xfrm>
+                <a:off x="609441" y="4860334"/>
+                <a:ext cx="11198542" cy="1361911"/>
+              </a:xfrm>
+              <a:prstGeom prst="rect">
+                <a:avLst/>
+              </a:prstGeom>
+              <a:solidFill>
+                <a:schemeClr val="bg1">
+                  <a:lumMod val="95000"/>
+                </a:schemeClr>
+              </a:solidFill>
+              <a:ln w="28575">
+                <a:solidFill>
+                  <a:srgbClr val="E0700D"/>
+                </a:solidFill>
+              </a:ln>
+            </p:spPr>
+            <p:txBody>
+              <a:bodyPr wrap="square" rtlCol="0">
+                <a:spAutoFit/>
+              </a:bodyPr>
+              <a:lstStyle/>
+              <a:p>
+                <a:pPr algn="just"/>
+                <a:r>
+                  <a:rPr lang="en-US" sz="1200" dirty="0">
+                    <a:latin typeface="Arial" panose="020B0604020202020204" pitchFamily="34" charset="0"/>
+                    <a:cs typeface="Arial" panose="020B0604020202020204" pitchFamily="34" charset="0"/>
+                  </a:rPr>
+                  <a:t>Find the second-degree polynomial coefficients and relate them with the group index and the dispersion parameter. </a:t>
+                </a:r>
+                <a14:m>
+                  <m:oMath xmlns:m="http://schemas.openxmlformats.org/officeDocument/2006/math">
+                    <m:d>
+                      <m:dPr>
+                        <m:begChr m:val="{"/>
+                        <m:endChr m:val=""/>
+                        <m:ctrlPr>
+                          <a:rPr lang="es-ES" sz="1200" b="0" i="1" smtClean="0">
+                            <a:latin typeface="Cambria Math" panose="02040503050406030204" pitchFamily="18" charset="0"/>
+                            <a:cs typeface="Arial" panose="020B0604020202020204" pitchFamily="34" charset="0"/>
+                          </a:rPr>
+                        </m:ctrlPr>
+                      </m:dPr>
+                      <m:e>
+                        <m:eqArr>
+                          <m:eqArrPr>
+                            <m:ctrlPr>
+                              <a:rPr lang="es-ES" sz="1200" b="0" i="1" smtClean="0">
+                                <a:latin typeface="Cambria Math" panose="02040503050406030204" pitchFamily="18" charset="0"/>
+                                <a:cs typeface="Arial" panose="020B0604020202020204" pitchFamily="34" charset="0"/>
+                              </a:rPr>
+                            </m:ctrlPr>
+                          </m:eqArrPr>
+                          <m:e>
+                            <m:sSub>
+                              <m:sSubPr>
+                                <m:ctrlPr>
+                                  <a:rPr lang="es-ES" sz="1200" b="0" i="1" smtClean="0">
+                                    <a:latin typeface="Cambria Math" panose="02040503050406030204" pitchFamily="18" charset="0"/>
+                                    <a:cs typeface="Arial" panose="020B0604020202020204" pitchFamily="34" charset="0"/>
+                                  </a:rPr>
+                                </m:ctrlPr>
+                              </m:sSubPr>
+                              <m:e>
+                                <m:r>
+                                  <a:rPr lang="es-ES" sz="1200" b="0" i="1" smtClean="0">
+                                    <a:latin typeface="Cambria Math" panose="02040503050406030204" pitchFamily="18" charset="0"/>
+                                    <a:cs typeface="Arial" panose="020B0604020202020204" pitchFamily="34" charset="0"/>
+                                  </a:rPr>
+                                  <m:t>𝑛</m:t>
+                                </m:r>
+                              </m:e>
+                              <m:sub>
+                                <m:r>
+                                  <a:rPr lang="es-ES" sz="1200" b="0" i="1" smtClean="0">
+                                    <a:latin typeface="Cambria Math" panose="02040503050406030204" pitchFamily="18" charset="0"/>
+                                    <a:cs typeface="Arial" panose="020B0604020202020204" pitchFamily="34" charset="0"/>
+                                  </a:rPr>
+                                  <m:t>𝑒𝑓𝑓</m:t>
+                                </m:r>
+                              </m:sub>
+                            </m:sSub>
+                            <m:r>
+                              <a:rPr lang="es-ES" sz="1200" b="0" i="1" smtClean="0">
+                                <a:latin typeface="Cambria Math" panose="02040503050406030204" pitchFamily="18" charset="0"/>
+                                <a:cs typeface="Arial" panose="020B0604020202020204" pitchFamily="34" charset="0"/>
+                              </a:rPr>
+                              <m:t>=</m:t>
+                            </m:r>
+                            <m:sSub>
+                              <m:sSubPr>
+                                <m:ctrlPr>
+                                  <a:rPr lang="es-ES" sz="1200" b="0" i="1" smtClean="0">
+                                    <a:latin typeface="Cambria Math" panose="02040503050406030204" pitchFamily="18" charset="0"/>
+                                    <a:cs typeface="Arial" panose="020B0604020202020204" pitchFamily="34" charset="0"/>
+                                  </a:rPr>
+                                </m:ctrlPr>
+                              </m:sSubPr>
+                              <m:e>
+                                <m:r>
+                                  <a:rPr lang="es-ES" sz="1200" b="0" i="1" smtClean="0">
+                                    <a:latin typeface="Cambria Math" panose="02040503050406030204" pitchFamily="18" charset="0"/>
+                                    <a:cs typeface="Arial" panose="020B0604020202020204" pitchFamily="34" charset="0"/>
+                                  </a:rPr>
+                                  <m:t>𝑛</m:t>
+                                </m:r>
+                              </m:e>
+                              <m:sub>
+                                <m:r>
+                                  <a:rPr lang="es-ES" sz="1200" b="0" i="1" smtClean="0">
+                                    <a:latin typeface="Cambria Math" panose="02040503050406030204" pitchFamily="18" charset="0"/>
+                                    <a:cs typeface="Arial" panose="020B0604020202020204" pitchFamily="34" charset="0"/>
+                                  </a:rPr>
+                                  <m:t>1</m:t>
+                                </m:r>
+                              </m:sub>
+                            </m:sSub>
+                          </m:e>
+                          <m:e>
+                            <m:sSub>
+                              <m:sSubPr>
+                                <m:ctrlPr>
+                                  <a:rPr lang="es-ES" sz="1200" b="0" i="1" smtClean="0">
+                                    <a:latin typeface="Cambria Math" panose="02040503050406030204" pitchFamily="18" charset="0"/>
+                                    <a:cs typeface="Arial" panose="020B0604020202020204" pitchFamily="34" charset="0"/>
+                                  </a:rPr>
+                                </m:ctrlPr>
+                              </m:sSubPr>
+                              <m:e>
+                                <m:r>
+                                  <a:rPr lang="es-ES" sz="1200" b="0" i="1" smtClean="0">
+                                    <a:latin typeface="Cambria Math" panose="02040503050406030204" pitchFamily="18" charset="0"/>
+                                    <a:cs typeface="Arial" panose="020B0604020202020204" pitchFamily="34" charset="0"/>
+                                  </a:rPr>
+                                  <m:t>𝑛</m:t>
+                                </m:r>
+                              </m:e>
+                              <m:sub>
+                                <m:r>
+                                  <a:rPr lang="es-ES" sz="1200" b="0" i="1" smtClean="0">
+                                    <a:latin typeface="Cambria Math" panose="02040503050406030204" pitchFamily="18" charset="0"/>
+                                    <a:cs typeface="Arial" panose="020B0604020202020204" pitchFamily="34" charset="0"/>
+                                  </a:rPr>
+                                  <m:t>𝑔</m:t>
+                                </m:r>
+                              </m:sub>
+                            </m:sSub>
+                            <m:r>
+                              <a:rPr lang="es-ES" sz="1200" b="0" i="1" smtClean="0">
+                                <a:latin typeface="Cambria Math" panose="02040503050406030204" pitchFamily="18" charset="0"/>
+                                <a:cs typeface="Arial" panose="020B0604020202020204" pitchFamily="34" charset="0"/>
+                              </a:rPr>
+                              <m:t>=</m:t>
+                            </m:r>
+                            <m:sSub>
+                              <m:sSubPr>
+                                <m:ctrlPr>
+                                  <a:rPr lang="es-ES" sz="1200" b="0" i="1" smtClean="0">
+                                    <a:latin typeface="Cambria Math" panose="02040503050406030204" pitchFamily="18" charset="0"/>
+                                    <a:cs typeface="Arial" panose="020B0604020202020204" pitchFamily="34" charset="0"/>
+                                  </a:rPr>
+                                </m:ctrlPr>
+                              </m:sSubPr>
+                              <m:e>
+                                <m:r>
+                                  <a:rPr lang="es-ES" sz="1200" b="0" i="1" smtClean="0">
+                                    <a:latin typeface="Cambria Math" panose="02040503050406030204" pitchFamily="18" charset="0"/>
+                                    <a:cs typeface="Arial" panose="020B0604020202020204" pitchFamily="34" charset="0"/>
+                                  </a:rPr>
+                                  <m:t>𝑛</m:t>
+                                </m:r>
+                              </m:e>
+                              <m:sub>
+                                <m:r>
+                                  <a:rPr lang="es-ES" sz="1200" b="0" i="1" smtClean="0">
+                                    <a:latin typeface="Cambria Math" panose="02040503050406030204" pitchFamily="18" charset="0"/>
+                                    <a:cs typeface="Arial" panose="020B0604020202020204" pitchFamily="34" charset="0"/>
+                                  </a:rPr>
+                                  <m:t>1</m:t>
+                                </m:r>
+                              </m:sub>
+                            </m:sSub>
+                            <m:r>
+                              <a:rPr lang="es-ES" sz="1200" b="0" i="1" smtClean="0">
+                                <a:latin typeface="Cambria Math" panose="02040503050406030204" pitchFamily="18" charset="0"/>
+                                <a:cs typeface="Arial" panose="020B0604020202020204" pitchFamily="34" charset="0"/>
+                              </a:rPr>
+                              <m:t>−</m:t>
+                            </m:r>
+                            <m:sSub>
+                              <m:sSubPr>
+                                <m:ctrlPr>
+                                  <a:rPr lang="es-ES" sz="1200" b="0" i="1" smtClean="0">
+                                    <a:latin typeface="Cambria Math" panose="02040503050406030204" pitchFamily="18" charset="0"/>
+                                    <a:cs typeface="Arial" panose="020B0604020202020204" pitchFamily="34" charset="0"/>
+                                  </a:rPr>
+                                </m:ctrlPr>
+                              </m:sSubPr>
+                              <m:e>
+                                <m:r>
+                                  <a:rPr lang="es-ES" sz="1200" b="0" i="1" smtClean="0">
+                                    <a:latin typeface="Cambria Math" panose="02040503050406030204" pitchFamily="18" charset="0"/>
+                                    <a:cs typeface="Arial" panose="020B0604020202020204" pitchFamily="34" charset="0"/>
+                                  </a:rPr>
+                                  <m:t>𝑛</m:t>
+                                </m:r>
+                              </m:e>
+                              <m:sub>
+                                <m:r>
+                                  <a:rPr lang="es-ES" sz="1200" b="0" i="1" smtClean="0">
+                                    <a:latin typeface="Cambria Math" panose="02040503050406030204" pitchFamily="18" charset="0"/>
+                                    <a:cs typeface="Arial" panose="020B0604020202020204" pitchFamily="34" charset="0"/>
+                                  </a:rPr>
+                                  <m:t>2</m:t>
+                                </m:r>
+                              </m:sub>
+                            </m:sSub>
+                            <m:sSub>
+                              <m:sSubPr>
+                                <m:ctrlPr>
+                                  <a:rPr lang="es-ES" sz="1200" b="0" i="1" smtClean="0">
+                                    <a:latin typeface="Cambria Math" panose="02040503050406030204" pitchFamily="18" charset="0"/>
+                                    <a:cs typeface="Arial" panose="020B0604020202020204" pitchFamily="34" charset="0"/>
+                                  </a:rPr>
+                                </m:ctrlPr>
+                              </m:sSubPr>
+                              <m:e>
+                                <m:r>
+                                  <a:rPr lang="es-ES" sz="1200" b="0" i="1" smtClean="0">
+                                    <a:latin typeface="Cambria Math" panose="02040503050406030204" pitchFamily="18" charset="0"/>
+                                    <a:cs typeface="Arial" panose="020B0604020202020204" pitchFamily="34" charset="0"/>
+                                  </a:rPr>
+                                  <m:t>𝜆</m:t>
+                                </m:r>
+                              </m:e>
+                              <m:sub>
+                                <m:r>
+                                  <a:rPr lang="es-ES" sz="1200" b="0" i="1" smtClean="0">
+                                    <a:latin typeface="Cambria Math" panose="02040503050406030204" pitchFamily="18" charset="0"/>
+                                    <a:cs typeface="Arial" panose="020B0604020202020204" pitchFamily="34" charset="0"/>
+                                  </a:rPr>
+                                  <m:t>0</m:t>
+                                </m:r>
+                              </m:sub>
+                            </m:sSub>
+                          </m:e>
+                          <m:e>
+                            <m:r>
+                              <a:rPr lang="es-ES" sz="1200" b="0" i="1" smtClean="0">
+                                <a:latin typeface="Cambria Math" panose="02040503050406030204" pitchFamily="18" charset="0"/>
+                                <a:cs typeface="Arial" panose="020B0604020202020204" pitchFamily="34" charset="0"/>
+                              </a:rPr>
+                              <m:t>𝐷</m:t>
+                            </m:r>
+                            <m:r>
+                              <a:rPr lang="es-ES" sz="1200" b="0" i="1" smtClean="0">
+                                <a:latin typeface="Cambria Math" panose="02040503050406030204" pitchFamily="18" charset="0"/>
+                                <a:cs typeface="Arial" panose="020B0604020202020204" pitchFamily="34" charset="0"/>
+                              </a:rPr>
+                              <m:t>=−</m:t>
+                            </m:r>
+                            <m:f>
+                              <m:fPr>
+                                <m:ctrlPr>
+                                  <a:rPr lang="es-ES" sz="1200" b="0" i="1" smtClean="0">
+                                    <a:latin typeface="Cambria Math" panose="02040503050406030204" pitchFamily="18" charset="0"/>
+                                    <a:cs typeface="Arial" panose="020B0604020202020204" pitchFamily="34" charset="0"/>
+                                  </a:rPr>
+                                </m:ctrlPr>
+                              </m:fPr>
+                              <m:num>
+                                <m:r>
+                                  <a:rPr lang="es-ES" sz="1200" b="0" i="1" smtClean="0">
+                                    <a:latin typeface="Cambria Math" panose="02040503050406030204" pitchFamily="18" charset="0"/>
+                                    <a:cs typeface="Arial" panose="020B0604020202020204" pitchFamily="34" charset="0"/>
+                                  </a:rPr>
+                                  <m:t>2</m:t>
+                                </m:r>
+                                <m:sSub>
+                                  <m:sSubPr>
+                                    <m:ctrlPr>
+                                      <a:rPr lang="es-ES" sz="1200" b="0" i="1" smtClean="0">
+                                        <a:latin typeface="Cambria Math" panose="02040503050406030204" pitchFamily="18" charset="0"/>
+                                        <a:cs typeface="Arial" panose="020B0604020202020204" pitchFamily="34" charset="0"/>
+                                      </a:rPr>
+                                    </m:ctrlPr>
+                                  </m:sSubPr>
+                                  <m:e>
+                                    <m:r>
+                                      <a:rPr lang="es-ES" sz="1200" b="0" i="1" smtClean="0">
+                                        <a:latin typeface="Cambria Math" panose="02040503050406030204" pitchFamily="18" charset="0"/>
+                                        <a:cs typeface="Arial" panose="020B0604020202020204" pitchFamily="34" charset="0"/>
+                                      </a:rPr>
+                                      <m:t>𝜆</m:t>
+                                    </m:r>
+                                  </m:e>
+                                  <m:sub>
+                                    <m:r>
+                                      <a:rPr lang="es-ES" sz="1200" b="0" i="1" smtClean="0">
+                                        <a:latin typeface="Cambria Math" panose="02040503050406030204" pitchFamily="18" charset="0"/>
+                                        <a:cs typeface="Arial" panose="020B0604020202020204" pitchFamily="34" charset="0"/>
+                                      </a:rPr>
+                                      <m:t>0</m:t>
+                                    </m:r>
+                                  </m:sub>
+                                </m:sSub>
+                                <m:sSub>
+                                  <m:sSubPr>
+                                    <m:ctrlPr>
+                                      <a:rPr lang="es-ES" sz="1200" b="0" i="1" smtClean="0">
+                                        <a:latin typeface="Cambria Math" panose="02040503050406030204" pitchFamily="18" charset="0"/>
+                                        <a:cs typeface="Arial" panose="020B0604020202020204" pitchFamily="34" charset="0"/>
+                                      </a:rPr>
+                                    </m:ctrlPr>
+                                  </m:sSubPr>
+                                  <m:e>
+                                    <m:r>
+                                      <a:rPr lang="es-ES" sz="1200" b="0" i="1" smtClean="0">
+                                        <a:latin typeface="Cambria Math" panose="02040503050406030204" pitchFamily="18" charset="0"/>
+                                        <a:cs typeface="Arial" panose="020B0604020202020204" pitchFamily="34" charset="0"/>
+                                      </a:rPr>
+                                      <m:t>𝑛</m:t>
+                                    </m:r>
+                                  </m:e>
+                                  <m:sub>
+                                    <m:r>
+                                      <a:rPr lang="es-ES" sz="1200" b="0" i="1" smtClean="0">
+                                        <a:latin typeface="Cambria Math" panose="02040503050406030204" pitchFamily="18" charset="0"/>
+                                        <a:cs typeface="Arial" panose="020B0604020202020204" pitchFamily="34" charset="0"/>
+                                      </a:rPr>
+                                      <m:t>3</m:t>
+                                    </m:r>
+                                  </m:sub>
+                                </m:sSub>
+                              </m:num>
+                              <m:den>
+                                <m:r>
+                                  <a:rPr lang="es-ES" sz="1200" b="0" i="1" smtClean="0">
+                                    <a:latin typeface="Cambria Math" panose="02040503050406030204" pitchFamily="18" charset="0"/>
+                                    <a:cs typeface="Arial" panose="020B0604020202020204" pitchFamily="34" charset="0"/>
+                                  </a:rPr>
+                                  <m:t>𝑐</m:t>
+                                </m:r>
+                              </m:den>
+                            </m:f>
+                            <m:d>
+                              <m:dPr>
+                                <m:begChr m:val="["/>
+                                <m:endChr m:val="]"/>
+                                <m:ctrlPr>
+                                  <a:rPr lang="es-ES" sz="1200" b="0" i="1" smtClean="0">
+                                    <a:latin typeface="Cambria Math" panose="02040503050406030204" pitchFamily="18" charset="0"/>
+                                    <a:cs typeface="Arial" panose="020B0604020202020204" pitchFamily="34" charset="0"/>
+                                  </a:rPr>
+                                </m:ctrlPr>
+                              </m:dPr>
+                              <m:e>
+                                <m:f>
+                                  <m:fPr>
+                                    <m:ctrlPr>
+                                      <a:rPr lang="es-ES" sz="1200" b="0" i="1" smtClean="0">
+                                        <a:latin typeface="Cambria Math" panose="02040503050406030204" pitchFamily="18" charset="0"/>
+                                        <a:cs typeface="Arial" panose="020B0604020202020204" pitchFamily="34" charset="0"/>
+                                      </a:rPr>
+                                    </m:ctrlPr>
+                                  </m:fPr>
+                                  <m:num>
+                                    <m:sSup>
+                                      <m:sSupPr>
+                                        <m:ctrlPr>
+                                          <a:rPr lang="es-ES" sz="1200" b="0" i="1" smtClean="0">
+                                            <a:latin typeface="Cambria Math" panose="02040503050406030204" pitchFamily="18" charset="0"/>
+                                            <a:cs typeface="Arial" panose="020B0604020202020204" pitchFamily="34" charset="0"/>
+                                          </a:rPr>
+                                        </m:ctrlPr>
+                                      </m:sSupPr>
+                                      <m:e>
+                                        <m:r>
+                                          <a:rPr lang="es-ES" sz="1200" b="0" i="1" smtClean="0">
+                                            <a:latin typeface="Cambria Math" panose="02040503050406030204" pitchFamily="18" charset="0"/>
+                                            <a:cs typeface="Arial" panose="020B0604020202020204" pitchFamily="34" charset="0"/>
+                                          </a:rPr>
+                                          <m:t>𝑠</m:t>
+                                        </m:r>
+                                      </m:e>
+                                      <m:sup>
+                                        <m:r>
+                                          <a:rPr lang="es-ES" sz="1200" b="0" i="1" smtClean="0">
+                                            <a:latin typeface="Cambria Math" panose="02040503050406030204" pitchFamily="18" charset="0"/>
+                                            <a:cs typeface="Arial" panose="020B0604020202020204" pitchFamily="34" charset="0"/>
+                                          </a:rPr>
+                                          <m:t>2</m:t>
+                                        </m:r>
+                                      </m:sup>
+                                    </m:sSup>
+                                  </m:num>
+                                  <m:den>
+                                    <m:r>
+                                      <a:rPr lang="es-ES" sz="1200" b="0" i="1" smtClean="0">
+                                        <a:latin typeface="Cambria Math" panose="02040503050406030204" pitchFamily="18" charset="0"/>
+                                        <a:cs typeface="Arial" panose="020B0604020202020204" pitchFamily="34" charset="0"/>
+                                      </a:rPr>
+                                      <m:t>𝑚</m:t>
+                                    </m:r>
+                                  </m:den>
+                                </m:f>
+                              </m:e>
+                            </m:d>
+                          </m:e>
+                        </m:eqArr>
+                      </m:e>
+                    </m:d>
+                  </m:oMath>
+                </a14:m>
+                <a:endParaRPr lang="es-ES" sz="1200" b="0" dirty="0">
+                  <a:latin typeface="Arial" panose="020B0604020202020204" pitchFamily="34" charset="0"/>
+                  <a:cs typeface="Arial" panose="020B0604020202020204" pitchFamily="34" charset="0"/>
+                </a:endParaRPr>
+              </a:p>
+              <a:p>
+                <a:pPr algn="just"/>
+                <a:r>
+                  <a:rPr lang="en-US" sz="1200" dirty="0">
+                    <a:latin typeface="Arial" panose="020B0604020202020204" pitchFamily="34" charset="0"/>
+                    <a:cs typeface="Arial" panose="020B0604020202020204" pitchFamily="34" charset="0"/>
+                  </a:rPr>
+                  <a:t> </a:t>
+                </a:r>
+              </a:p>
+              <a:p>
+                <a:pPr algn="just"/>
+                <a:r>
+                  <a:rPr lang="en-US" sz="1200" dirty="0">
+                    <a:latin typeface="Arial" panose="020B0604020202020204" pitchFamily="34" charset="0"/>
+                    <a:cs typeface="Arial" panose="020B0604020202020204" pitchFamily="34" charset="0"/>
+                  </a:rPr>
+                  <a:t>Comment on the results found for the TE0 and TM0 for both deep and shallow waveguides. </a:t>
+                </a:r>
+              </a:p>
+              <a:p>
+                <a:pPr algn="just"/>
+                <a:endParaRPr lang="en-US" sz="1200" dirty="0">
+                  <a:latin typeface="Arial" panose="020B0604020202020204" pitchFamily="34" charset="0"/>
+                  <a:cs typeface="Arial" panose="020B0604020202020204" pitchFamily="34" charset="0"/>
+                </a:endParaRPr>
+              </a:p>
+            </p:txBody>
+          </p:sp>
+        </mc:Choice>
+        <mc:Fallback xmlns="">
+          <p:sp>
+            <p:nvSpPr>
+              <p:cNvPr id="2" name="CuadroTexto 1">
+                <a:extLst>
+                  <a:ext uri="{FF2B5EF4-FFF2-40B4-BE49-F238E27FC236}">
+                    <a16:creationId xmlns:a16="http://schemas.microsoft.com/office/drawing/2014/main" id="{A440F587-93A3-E474-C0B0-883BB9DAFD85}"/>
+                  </a:ext>
+                </a:extLst>
+              </p:cNvPr>
+              <p:cNvSpPr txBox="1">
+                <a:spLocks noRot="1" noChangeAspect="1" noMove="1" noResize="1" noEditPoints="1" noAdjustHandles="1" noChangeArrowheads="1" noChangeShapeType="1" noTextEdit="1"/>
+              </p:cNvSpPr>
+              <p:nvPr/>
+            </p:nvSpPr>
+            <p:spPr>
+              <a:xfrm>
+                <a:off x="609441" y="4860334"/>
+                <a:ext cx="11198542" cy="1361911"/>
+              </a:xfrm>
+              <a:prstGeom prst="rect">
+                <a:avLst/>
+              </a:prstGeom>
+              <a:blipFill>
+                <a:blip r:embed="rId6"/>
+                <a:stretch>
+                  <a:fillRect/>
+                </a:stretch>
+              </a:blipFill>
+              <a:ln w="28575">
+                <a:solidFill>
+                  <a:srgbClr val="E0700D"/>
+                </a:solidFill>
+              </a:ln>
+            </p:spPr>
+            <p:txBody>
+              <a:bodyPr/>
+              <a:lstStyle/>
+              <a:p>
+                <a:r>
+                  <a:rPr lang="es-ES">
+                    <a:noFill/>
+                  </a:rPr>
+                  <a:t> </a:t>
+                </a:r>
+              </a:p>
+            </p:txBody>
+          </p:sp>
+        </mc:Fallback>
+      </mc:AlternateContent>
+      <p:sp>
+        <p:nvSpPr>
+          <p:cNvPr id="5" name="Rectángulo 4">
+            <a:extLst>
+              <a:ext uri="{FF2B5EF4-FFF2-40B4-BE49-F238E27FC236}">
+                <a16:creationId xmlns:a16="http://schemas.microsoft.com/office/drawing/2014/main" id="{A6B92C76-6772-2E00-346F-532321092C04}"/>
+              </a:ext>
+            </a:extLst>
+          </p:cNvPr>
+          <p:cNvSpPr/>
+          <p:nvPr/>
+        </p:nvSpPr>
+        <p:spPr>
+          <a:xfrm>
+            <a:off x="609441" y="1447800"/>
+            <a:ext cx="5486559" cy="3306028"/>
+          </a:xfrm>
+          <a:prstGeom prst="rect">
+            <a:avLst/>
+          </a:prstGeom>
+          <a:noFill/>
+          <a:ln w="28575">
+            <a:solidFill>
+              <a:srgbClr val="E0700D"/>
+            </a:solidFill>
+          </a:ln>
+        </p:spPr>
+        <p:style>
+          <a:lnRef idx="2">
+            <a:schemeClr val="accent1">
+              <a:shade val="15000"/>
+            </a:schemeClr>
+          </a:lnRef>
+          <a:fillRef idx="1">
+            <a:schemeClr val="accent1"/>
+          </a:fillRef>
+          <a:effectRef idx="0">
+            <a:schemeClr val="accent1"/>
+          </a:effectRef>
+          <a:fontRef idx="minor">
+            <a:schemeClr val="lt1"/>
+          </a:fontRef>
+        </p:style>
+        <p:txBody>
+          <a:bodyPr rtlCol="0" anchor="ctr"/>
+          <a:lstStyle/>
+          <a:p>
+            <a:pPr algn="ctr"/>
+            <a:endParaRPr lang="en-US"/>
+          </a:p>
+        </p:txBody>
+      </p:sp>
+      <p:sp>
+        <p:nvSpPr>
+          <p:cNvPr id="6" name="Rectángulo 5">
+            <a:extLst>
+              <a:ext uri="{FF2B5EF4-FFF2-40B4-BE49-F238E27FC236}">
+                <a16:creationId xmlns:a16="http://schemas.microsoft.com/office/drawing/2014/main" id="{2886628E-6E58-1F7E-B6C6-432B9A228397}"/>
+              </a:ext>
+            </a:extLst>
+          </p:cNvPr>
+          <p:cNvSpPr/>
+          <p:nvPr/>
+        </p:nvSpPr>
+        <p:spPr>
+          <a:xfrm>
+            <a:off x="6321424" y="1447800"/>
+            <a:ext cx="5486559" cy="3306028"/>
+          </a:xfrm>
+          <a:prstGeom prst="rect">
+            <a:avLst/>
+          </a:prstGeom>
+          <a:noFill/>
+          <a:ln w="28575">
+            <a:solidFill>
+              <a:srgbClr val="E0700D"/>
+            </a:solidFill>
+          </a:ln>
+        </p:spPr>
+        <p:style>
+          <a:lnRef idx="2">
+            <a:schemeClr val="accent1">
+              <a:shade val="15000"/>
+            </a:schemeClr>
+          </a:lnRef>
+          <a:fillRef idx="1">
+            <a:schemeClr val="accent1"/>
+          </a:fillRef>
+          <a:effectRef idx="0">
+            <a:schemeClr val="accent1"/>
+          </a:effectRef>
+          <a:fontRef idx="minor">
+            <a:schemeClr val="lt1"/>
+          </a:fontRef>
+        </p:style>
+        <p:txBody>
+          <a:bodyPr rtlCol="0" anchor="ctr"/>
+          <a:lstStyle/>
+          <a:p>
+            <a:pPr algn="ctr"/>
+            <a:endParaRPr lang="en-US"/>
+          </a:p>
+        </p:txBody>
+      </p:sp>
+      <mc:AlternateContent xmlns:mc="http://schemas.openxmlformats.org/markup-compatibility/2006" xmlns:a14="http://schemas.microsoft.com/office/drawing/2010/main">
+        <mc:Choice Requires="a14">
+          <p:sp>
+            <p:nvSpPr>
+              <p:cNvPr id="9" name="CuadroTexto 8">
+                <a:extLst>
+                  <a:ext uri="{FF2B5EF4-FFF2-40B4-BE49-F238E27FC236}">
+                    <a16:creationId xmlns:a16="http://schemas.microsoft.com/office/drawing/2014/main" id="{C59B6428-4395-242F-54D8-A9FC610F2D7A}"/>
+                  </a:ext>
+                </a:extLst>
+              </p:cNvPr>
+              <p:cNvSpPr txBox="1"/>
+              <p:nvPr/>
+            </p:nvSpPr>
+            <p:spPr>
+              <a:xfrm>
+                <a:off x="609440" y="2709096"/>
+                <a:ext cx="5486559" cy="1200329"/>
+              </a:xfrm>
+              <a:prstGeom prst="rect">
+                <a:avLst/>
+              </a:prstGeom>
+              <a:noFill/>
+            </p:spPr>
+            <p:txBody>
+              <a:bodyPr wrap="square" rtlCol="0">
+                <a:spAutoFit/>
+              </a:bodyPr>
+              <a:lstStyle/>
+              <a:p>
+                <a:pPr algn="ctr"/>
+                <a:r>
+                  <a:rPr lang="en-US" b="1" dirty="0"/>
+                  <a:t>deep</a:t>
+                </a:r>
+                <a:r>
+                  <a:rPr lang="en-US" dirty="0"/>
+                  <a:t> waveguide</a:t>
+                </a:r>
+              </a:p>
+              <a:p>
+                <a:pPr algn="ctr"/>
+                <a:endParaRPr lang="en-US" dirty="0"/>
+              </a:p>
+              <a:p>
+                <a:pPr algn="ctr"/>
+                <a:r>
+                  <a:rPr lang="en-US" b="1" dirty="0"/>
+                  <a:t>neff_TE0 vs </a:t>
+                </a:r>
+                <a14:m>
+                  <m:oMath xmlns:m="http://schemas.openxmlformats.org/officeDocument/2006/math">
+                    <m:r>
+                      <a:rPr lang="es-ES" b="1" i="1" smtClean="0">
+                        <a:latin typeface="Cambria Math" panose="02040503050406030204" pitchFamily="18" charset="0"/>
+                      </a:rPr>
+                      <m:t>𝝀</m:t>
+                    </m:r>
+                  </m:oMath>
+                </a14:m>
+                <a:r>
+                  <a:rPr lang="en-US" b="1" dirty="0"/>
+                  <a:t> </a:t>
+                </a:r>
+                <a:r>
+                  <a:rPr lang="en-US" dirty="0"/>
+                  <a:t>with the second-degree polynomial fit  </a:t>
+                </a:r>
+              </a:p>
+              <a:p>
+                <a:pPr algn="ctr"/>
+                <a:r>
+                  <a:rPr lang="en-US" dirty="0"/>
+                  <a:t>&amp; </a:t>
+                </a:r>
+                <a:r>
+                  <a:rPr lang="en-US" b="1" dirty="0"/>
+                  <a:t>neff_TM0 vs </a:t>
+                </a:r>
+                <a14:m>
+                  <m:oMath xmlns:m="http://schemas.openxmlformats.org/officeDocument/2006/math">
+                    <m:r>
+                      <a:rPr lang="es-ES" b="1" i="1">
+                        <a:latin typeface="Cambria Math" panose="02040503050406030204" pitchFamily="18" charset="0"/>
+                      </a:rPr>
+                      <m:t>𝝀</m:t>
+                    </m:r>
+                  </m:oMath>
+                </a14:m>
+                <a:r>
+                  <a:rPr lang="en-US" b="1" dirty="0"/>
+                  <a:t> </a:t>
+                </a:r>
+                <a:r>
+                  <a:rPr lang="en-US" dirty="0"/>
+                  <a:t>with the second-degree polynomial fit </a:t>
+                </a:r>
+              </a:p>
+            </p:txBody>
+          </p:sp>
+        </mc:Choice>
+        <mc:Fallback xmlns="">
+          <p:sp>
+            <p:nvSpPr>
+              <p:cNvPr id="9" name="CuadroTexto 8">
+                <a:extLst>
+                  <a:ext uri="{FF2B5EF4-FFF2-40B4-BE49-F238E27FC236}">
+                    <a16:creationId xmlns:a16="http://schemas.microsoft.com/office/drawing/2014/main" id="{C59B6428-4395-242F-54D8-A9FC610F2D7A}"/>
+                  </a:ext>
+                </a:extLst>
+              </p:cNvPr>
+              <p:cNvSpPr txBox="1">
+                <a:spLocks noRot="1" noChangeAspect="1" noMove="1" noResize="1" noEditPoints="1" noAdjustHandles="1" noChangeArrowheads="1" noChangeShapeType="1" noTextEdit="1"/>
+              </p:cNvSpPr>
+              <p:nvPr/>
+            </p:nvSpPr>
+            <p:spPr>
+              <a:xfrm>
+                <a:off x="609440" y="2709096"/>
+                <a:ext cx="5486559" cy="1200329"/>
+              </a:xfrm>
+              <a:prstGeom prst="rect">
+                <a:avLst/>
+              </a:prstGeom>
+              <a:blipFill>
+                <a:blip r:embed="rId7"/>
+                <a:stretch>
+                  <a:fillRect t="-2538" r="-556" b="-7107"/>
+                </a:stretch>
+              </a:blipFill>
+            </p:spPr>
+            <p:txBody>
+              <a:bodyPr/>
+              <a:lstStyle/>
+              <a:p>
+                <a:r>
+                  <a:rPr lang="es-ES">
+                    <a:noFill/>
+                  </a:rPr>
+                  <a:t> </a:t>
+                </a:r>
+              </a:p>
+            </p:txBody>
+          </p:sp>
+        </mc:Fallback>
+      </mc:AlternateContent>
+      <mc:AlternateContent xmlns:mc="http://schemas.openxmlformats.org/markup-compatibility/2006" xmlns:a14="http://schemas.microsoft.com/office/drawing/2010/main">
+        <mc:Choice Requires="a14">
+          <p:sp>
+            <p:nvSpPr>
+              <p:cNvPr id="10" name="CuadroTexto 9">
+                <a:extLst>
+                  <a:ext uri="{FF2B5EF4-FFF2-40B4-BE49-F238E27FC236}">
+                    <a16:creationId xmlns:a16="http://schemas.microsoft.com/office/drawing/2014/main" id="{9320AF78-1FC6-19F4-8E0B-8A414F20C6DE}"/>
+                  </a:ext>
+                </a:extLst>
+              </p:cNvPr>
+              <p:cNvSpPr txBox="1"/>
+              <p:nvPr/>
+            </p:nvSpPr>
+            <p:spPr>
+              <a:xfrm>
+                <a:off x="6321421" y="2709096"/>
+                <a:ext cx="5486559" cy="1200329"/>
+              </a:xfrm>
+              <a:prstGeom prst="rect">
+                <a:avLst/>
+              </a:prstGeom>
+              <a:noFill/>
+            </p:spPr>
+            <p:txBody>
+              <a:bodyPr wrap="square" rtlCol="0">
+                <a:spAutoFit/>
+              </a:bodyPr>
+              <a:lstStyle/>
+              <a:p>
+                <a:pPr algn="ctr"/>
+                <a:r>
+                  <a:rPr lang="en-US" b="1" dirty="0"/>
+                  <a:t>shallow</a:t>
+                </a:r>
+                <a:r>
+                  <a:rPr lang="en-US" dirty="0"/>
+                  <a:t> waveguide</a:t>
+                </a:r>
+              </a:p>
+              <a:p>
+                <a:pPr algn="ctr"/>
+                <a:endParaRPr lang="en-US" dirty="0"/>
+              </a:p>
+              <a:p>
+                <a:pPr algn="ctr"/>
+                <a:r>
+                  <a:rPr lang="en-US" b="1" dirty="0"/>
+                  <a:t>neff_TE0 vs </a:t>
+                </a:r>
+                <a14:m>
+                  <m:oMath xmlns:m="http://schemas.openxmlformats.org/officeDocument/2006/math">
+                    <m:r>
+                      <a:rPr lang="es-ES" b="1" i="1">
+                        <a:latin typeface="Cambria Math" panose="02040503050406030204" pitchFamily="18" charset="0"/>
+                      </a:rPr>
+                      <m:t>𝝀</m:t>
+                    </m:r>
+                  </m:oMath>
+                </a14:m>
+                <a:r>
+                  <a:rPr lang="en-US" b="1" dirty="0"/>
+                  <a:t> </a:t>
+                </a:r>
+                <a:r>
+                  <a:rPr lang="en-US" dirty="0"/>
+                  <a:t>with the second-degree polynomial fit  </a:t>
+                </a:r>
+              </a:p>
+              <a:p>
+                <a:pPr algn="ctr"/>
+                <a:r>
+                  <a:rPr lang="en-US" dirty="0"/>
+                  <a:t>&amp; </a:t>
+                </a:r>
+                <a:r>
+                  <a:rPr lang="en-US" b="1" dirty="0"/>
+                  <a:t>neff_TM0 vs </a:t>
+                </a:r>
+                <a14:m>
+                  <m:oMath xmlns:m="http://schemas.openxmlformats.org/officeDocument/2006/math">
+                    <m:r>
+                      <a:rPr lang="es-ES" b="1" i="1">
+                        <a:latin typeface="Cambria Math" panose="02040503050406030204" pitchFamily="18" charset="0"/>
+                      </a:rPr>
+                      <m:t>𝝀</m:t>
+                    </m:r>
+                  </m:oMath>
+                </a14:m>
+                <a:r>
+                  <a:rPr lang="en-US" b="1" dirty="0"/>
+                  <a:t> </a:t>
+                </a:r>
+                <a:r>
+                  <a:rPr lang="en-US" dirty="0"/>
+                  <a:t>with the second-degree polynomial fit </a:t>
+                </a:r>
+              </a:p>
+            </p:txBody>
+          </p:sp>
+        </mc:Choice>
+        <mc:Fallback xmlns="">
+          <p:sp>
+            <p:nvSpPr>
+              <p:cNvPr id="10" name="CuadroTexto 9">
+                <a:extLst>
+                  <a:ext uri="{FF2B5EF4-FFF2-40B4-BE49-F238E27FC236}">
+                    <a16:creationId xmlns:a16="http://schemas.microsoft.com/office/drawing/2014/main" id="{9320AF78-1FC6-19F4-8E0B-8A414F20C6DE}"/>
+                  </a:ext>
+                </a:extLst>
+              </p:cNvPr>
+              <p:cNvSpPr txBox="1">
+                <a:spLocks noRot="1" noChangeAspect="1" noMove="1" noResize="1" noEditPoints="1" noAdjustHandles="1" noChangeArrowheads="1" noChangeShapeType="1" noTextEdit="1"/>
+              </p:cNvSpPr>
+              <p:nvPr/>
+            </p:nvSpPr>
+            <p:spPr>
+              <a:xfrm>
+                <a:off x="6321421" y="2709096"/>
+                <a:ext cx="5486559" cy="1200329"/>
+              </a:xfrm>
+              <a:prstGeom prst="rect">
+                <a:avLst/>
+              </a:prstGeom>
+              <a:blipFill>
+                <a:blip r:embed="rId8"/>
+                <a:stretch>
+                  <a:fillRect t="-2538" r="-556" b="-7107"/>
+                </a:stretch>
+              </a:blipFill>
+            </p:spPr>
+            <p:txBody>
+              <a:bodyPr/>
+              <a:lstStyle/>
+              <a:p>
+                <a:r>
+                  <a:rPr lang="es-ES">
+                    <a:noFill/>
+                  </a:rPr>
+                  <a:t> </a:t>
+                </a:r>
+              </a:p>
+            </p:txBody>
+          </p:sp>
+        </mc:Fallback>
+      </mc:AlternateContent>
+      <p:sp>
+        <p:nvSpPr>
+          <p:cNvPr id="8" name="CuadroTexto 7">
+            <a:extLst>
+              <a:ext uri="{FF2B5EF4-FFF2-40B4-BE49-F238E27FC236}">
+                <a16:creationId xmlns:a16="http://schemas.microsoft.com/office/drawing/2014/main" id="{0F38E924-A0E7-A039-C837-916BA77FE89B}"/>
+              </a:ext>
+            </a:extLst>
+          </p:cNvPr>
+          <p:cNvSpPr txBox="1"/>
+          <p:nvPr/>
+        </p:nvSpPr>
+        <p:spPr>
+          <a:xfrm>
+            <a:off x="6347361" y="4498712"/>
+            <a:ext cx="5486560" cy="276999"/>
+          </a:xfrm>
+          <a:prstGeom prst="rect">
+            <a:avLst/>
+          </a:prstGeom>
+          <a:noFill/>
+        </p:spPr>
+        <p:txBody>
+          <a:bodyPr wrap="square">
+            <a:spAutoFit/>
+          </a:bodyPr>
+          <a:lstStyle/>
+          <a:p>
+            <a:pPr algn="r"/>
+            <a:r>
+              <a:rPr lang="en-US" sz="1200" b="1" dirty="0">
+                <a:solidFill>
+                  <a:schemeClr val="tx1"/>
+                </a:solidFill>
+                <a:latin typeface="Arial" panose="020B0604020202020204" pitchFamily="34" charset="0"/>
+                <a:cs typeface="Arial" panose="020B0604020202020204" pitchFamily="34" charset="0"/>
+              </a:rPr>
+              <a:t>slab: 150nm</a:t>
+            </a:r>
+            <a:endParaRPr lang="en-US" sz="1200" dirty="0">
+              <a:solidFill>
+                <a:schemeClr val="tx1"/>
+              </a:solidFill>
+              <a:latin typeface="Arial" panose="020B0604020202020204" pitchFamily="34" charset="0"/>
+              <a:cs typeface="Arial" panose="020B0604020202020204" pitchFamily="34" charset="0"/>
+            </a:endParaRPr>
+          </a:p>
+        </p:txBody>
+      </p:sp>
+    </p:spTree>
+    <p:extLst>
+      <p:ext uri="{BB962C8B-B14F-4D97-AF65-F5344CB8AC3E}">
+        <p14:creationId xmlns:p14="http://schemas.microsoft.com/office/powerpoint/2010/main" val="236054401"/>
+      </p:ext>
+    </p:extLst>
+  </p:cSld>
+  <p:clrMapOvr>
+    <a:masterClrMapping/>
+  </p:clrMapOvr>
+</p:sld>
+</file>
+
+<file path=ppt/slides/slide7.xml><?xml version="1.0" encoding="utf-8"?>
+<p:sld xmlns:a="http://schemas.openxmlformats.org/drawingml/2006/main" xmlns:r="http://schemas.openxmlformats.org/officeDocument/2006/relationships" xmlns:p="http://schemas.openxmlformats.org/presentationml/2006/main">
+  <p:cSld>
+    <p:spTree>
+      <p:nvGrpSpPr>
+        <p:cNvPr id="1" name="">
+          <a:extLst>
+            <a:ext uri="{FF2B5EF4-FFF2-40B4-BE49-F238E27FC236}">
+              <a16:creationId xmlns:a16="http://schemas.microsoft.com/office/drawing/2014/main" id="{25434E70-43B1-3881-1771-20FB4358471D}"/>
+            </a:ext>
+          </a:extLst>
+        </p:cNvPr>
+        <p:cNvGrpSpPr/>
+        <p:nvPr/>
+      </p:nvGrpSpPr>
+      <p:grpSpPr>
+        <a:xfrm>
+          <a:off x="0" y="0"/>
+          <a:ext cx="0" cy="0"/>
+          <a:chOff x="0" y="0"/>
+          <a:chExt cx="0" cy="0"/>
+        </a:xfrm>
+      </p:grpSpPr>
+      <p:sp>
+        <p:nvSpPr>
+          <p:cNvPr id="16" name="object 16">
+            <a:extLst>
+              <a:ext uri="{FF2B5EF4-FFF2-40B4-BE49-F238E27FC236}">
+                <a16:creationId xmlns:a16="http://schemas.microsoft.com/office/drawing/2014/main" id="{742C31CE-19F0-B995-0997-9A2D6A879BF7}"/>
+              </a:ext>
+            </a:extLst>
+          </p:cNvPr>
+          <p:cNvSpPr txBox="1">
+            <a:spLocks noGrp="1"/>
+          </p:cNvSpPr>
+          <p:nvPr>
+            <p:ph type="title"/>
+          </p:nvPr>
+        </p:nvSpPr>
+        <p:spPr>
+          <a:xfrm>
+            <a:off x="685800" y="408883"/>
+            <a:ext cx="10994410" cy="1090042"/>
+          </a:xfrm>
+          <a:prstGeom prst="rect">
+            <a:avLst/>
+          </a:prstGeom>
+        </p:spPr>
+        <p:txBody>
+          <a:bodyPr vert="horz" wrap="square" lIns="0" tIns="12700" rIns="0" bIns="0" rtlCol="0">
+            <a:spAutoFit/>
+          </a:bodyPr>
+          <a:lstStyle/>
+          <a:p>
+            <a:pPr marL="12700">
+              <a:lnSpc>
+                <a:spcPct val="100000"/>
+              </a:lnSpc>
+              <a:spcBef>
+                <a:spcPts val="100"/>
+              </a:spcBef>
+            </a:pPr>
+            <a:r>
+              <a:rPr lang="en-US" sz="2500" dirty="0"/>
+              <a:t>Learning outcome #5 – Bend waveguide radius vs. loss – deep</a:t>
+            </a:r>
+            <a:br>
+              <a:rPr lang="en-US" sz="2500" dirty="0"/>
+            </a:br>
+            <a:r>
+              <a:rPr lang="en-US" b="0" dirty="0"/>
+              <a:t>Find  neff_TE0 for </a:t>
+            </a:r>
+            <a:r>
+              <a:rPr lang="en-US" b="0" dirty="0" err="1"/>
+              <a:t>wvl</a:t>
+            </a:r>
+            <a:r>
+              <a:rPr lang="en-US" b="0" dirty="0"/>
+              <a:t> 1.55 µm, width 1.0 µm for R=25,50,75,100, 125,150 µm</a:t>
+            </a:r>
+            <a:br>
+              <a:rPr lang="en-US" sz="2500" dirty="0"/>
+            </a:br>
+            <a:endParaRPr lang="en-US" sz="2500" b="0" dirty="0">
+              <a:latin typeface="+mj-lt"/>
+              <a:cs typeface="Lucida Sans"/>
+            </a:endParaRPr>
+          </a:p>
+        </p:txBody>
+      </p:sp>
+      <p:pic>
+        <p:nvPicPr>
+          <p:cNvPr id="83" name="Gráfico 82">
+            <a:extLst>
+              <a:ext uri="{FF2B5EF4-FFF2-40B4-BE49-F238E27FC236}">
+                <a16:creationId xmlns:a16="http://schemas.microsoft.com/office/drawing/2014/main" id="{D688A609-F3DC-EE34-C536-683E70F32EAE}"/>
+              </a:ext>
+            </a:extLst>
+          </p:cNvPr>
+          <p:cNvPicPr>
+            <a:picLocks noChangeAspect="1"/>
+          </p:cNvPicPr>
+          <p:nvPr/>
+        </p:nvPicPr>
+        <p:blipFill>
+          <a:blip r:embed="rId3">
+            <a:extLst>
+              <a:ext uri="{96DAC541-7B7A-43D3-8B79-37D633B846F1}">
+                <asvg:svgBlip xmlns:asvg="http://schemas.microsoft.com/office/drawing/2016/SVG/main" r:embed="rId4"/>
+              </a:ext>
+            </a:extLst>
+          </a:blip>
+          <a:stretch>
+            <a:fillRect/>
+          </a:stretch>
+        </p:blipFill>
+        <p:spPr>
+          <a:xfrm>
+            <a:off x="5045006" y="6356057"/>
+            <a:ext cx="6409575" cy="363174"/>
+          </a:xfrm>
+          <a:prstGeom prst="rect">
+            <a:avLst/>
+          </a:prstGeom>
+        </p:spPr>
+      </p:pic>
+      <p:sp>
+        <p:nvSpPr>
+          <p:cNvPr id="84" name="Marcador de número de diapositiva 83">
+            <a:extLst>
+              <a:ext uri="{FF2B5EF4-FFF2-40B4-BE49-F238E27FC236}">
+                <a16:creationId xmlns:a16="http://schemas.microsoft.com/office/drawing/2014/main" id="{B6C672C6-89D4-7E67-2B94-811D081786A7}"/>
+              </a:ext>
+            </a:extLst>
+          </p:cNvPr>
+          <p:cNvSpPr>
+            <a:spLocks noGrp="1"/>
+          </p:cNvSpPr>
+          <p:nvPr>
+            <p:ph type="sldNum" sz="quarter" idx="7"/>
+          </p:nvPr>
+        </p:nvSpPr>
+        <p:spPr/>
+        <p:txBody>
+          <a:bodyPr/>
+          <a:lstStyle/>
+          <a:p>
+            <a:fld id="{B6F15528-21DE-4FAA-801E-634DDDAF4B2B}" type="slidenum">
+              <a:rPr lang="es-ES" smtClean="0"/>
+              <a:t>7</a:t>
+            </a:fld>
+            <a:endParaRPr lang="es-ES"/>
+          </a:p>
+        </p:txBody>
+      </p:sp>
+      <p:sp>
+        <p:nvSpPr>
+          <p:cNvPr id="3" name="Marcador de pie de página 2">
+            <a:extLst>
+              <a:ext uri="{FF2B5EF4-FFF2-40B4-BE49-F238E27FC236}">
+                <a16:creationId xmlns:a16="http://schemas.microsoft.com/office/drawing/2014/main" id="{AA1F4313-D710-7A3E-7A8F-EB77DEE3C1A7}"/>
+              </a:ext>
+            </a:extLst>
+          </p:cNvPr>
+          <p:cNvSpPr>
+            <a:spLocks noGrp="1"/>
+          </p:cNvSpPr>
+          <p:nvPr>
+            <p:ph type="ftr" sz="quarter" idx="5"/>
+          </p:nvPr>
+        </p:nvSpPr>
+        <p:spPr/>
+        <p:txBody>
+          <a:bodyPr/>
+          <a:lstStyle/>
+          <a:p>
+            <a:pPr marL="12700">
+              <a:spcBef>
+                <a:spcPts val="15"/>
+              </a:spcBef>
+            </a:pPr>
+            <a:r>
+              <a:rPr lang="es-ES" spc="-5"/>
+              <a:t>LAB 1.0. WAVEGUIDES</a:t>
+            </a:r>
+            <a:endParaRPr lang="es-ES" spc="-5" dirty="0"/>
+          </a:p>
+        </p:txBody>
+      </p:sp>
+      <p:sp>
+        <p:nvSpPr>
+          <p:cNvPr id="2" name="CuadroTexto 1">
+            <a:extLst>
+              <a:ext uri="{FF2B5EF4-FFF2-40B4-BE49-F238E27FC236}">
+                <a16:creationId xmlns:a16="http://schemas.microsoft.com/office/drawing/2014/main" id="{FDE3A197-9508-F9F1-1FEB-FF883D78C151}"/>
+              </a:ext>
+            </a:extLst>
+          </p:cNvPr>
+          <p:cNvSpPr txBox="1"/>
+          <p:nvPr/>
+        </p:nvSpPr>
+        <p:spPr>
+          <a:xfrm>
+            <a:off x="609441" y="4860334"/>
+            <a:ext cx="11199971" cy="1384995"/>
+          </a:xfrm>
+          <a:prstGeom prst="rect">
+            <a:avLst/>
+          </a:prstGeom>
+          <a:solidFill>
+            <a:schemeClr val="bg1">
+              <a:lumMod val="95000"/>
+            </a:schemeClr>
+          </a:solidFill>
+          <a:ln w="28575">
+            <a:solidFill>
+              <a:srgbClr val="E0700D"/>
+            </a:solidFill>
+          </a:ln>
+        </p:spPr>
+        <p:txBody>
+          <a:bodyPr wrap="square" rtlCol="0">
+            <a:spAutoFit/>
+          </a:bodyPr>
+          <a:lstStyle/>
+          <a:p>
+            <a:pPr algn="just"/>
+            <a:r>
+              <a:rPr lang="en-US" sz="1200" dirty="0">
+                <a:latin typeface="Arial" panose="020B0604020202020204" pitchFamily="34" charset="0"/>
+                <a:cs typeface="Arial" panose="020B0604020202020204" pitchFamily="34" charset="0"/>
+              </a:rPr>
+              <a:t>Comment results, which is the safe radius, consider safe means less than 0.1 dB/90º.</a:t>
+            </a:r>
+          </a:p>
+          <a:p>
+            <a:pPr algn="just"/>
+            <a:r>
+              <a:rPr lang="en-US" sz="1200" dirty="0">
+                <a:latin typeface="Arial" panose="020B0604020202020204" pitchFamily="34" charset="0"/>
+                <a:cs typeface="Arial" panose="020B0604020202020204" pitchFamily="34" charset="0"/>
+              </a:rPr>
+              <a:t>What if you perform the same analysis for shallow waveguides? </a:t>
+            </a:r>
+          </a:p>
+          <a:p>
+            <a:pPr algn="just"/>
+            <a:endParaRPr lang="en-US" sz="1200" dirty="0">
+              <a:latin typeface="Arial" panose="020B0604020202020204" pitchFamily="34" charset="0"/>
+              <a:cs typeface="Arial" panose="020B0604020202020204" pitchFamily="34" charset="0"/>
+            </a:endParaRPr>
+          </a:p>
+          <a:p>
+            <a:pPr algn="just"/>
+            <a:endParaRPr lang="en-US" sz="1200" dirty="0">
+              <a:latin typeface="Arial" panose="020B0604020202020204" pitchFamily="34" charset="0"/>
+              <a:cs typeface="Arial" panose="020B0604020202020204" pitchFamily="34" charset="0"/>
+            </a:endParaRPr>
+          </a:p>
+          <a:p>
+            <a:pPr algn="just"/>
+            <a:endParaRPr lang="en-US" sz="1200" dirty="0">
+              <a:latin typeface="Arial" panose="020B0604020202020204" pitchFamily="34" charset="0"/>
+              <a:cs typeface="Arial" panose="020B0604020202020204" pitchFamily="34" charset="0"/>
+            </a:endParaRPr>
+          </a:p>
+          <a:p>
+            <a:pPr algn="just"/>
+            <a:endParaRPr lang="en-US" sz="1200" dirty="0">
+              <a:latin typeface="Arial" panose="020B0604020202020204" pitchFamily="34" charset="0"/>
+              <a:cs typeface="Arial" panose="020B0604020202020204" pitchFamily="34" charset="0"/>
+            </a:endParaRPr>
+          </a:p>
+          <a:p>
+            <a:pPr algn="just"/>
+            <a:endParaRPr lang="en-US" sz="1200" dirty="0">
+              <a:latin typeface="Arial" panose="020B0604020202020204" pitchFamily="34" charset="0"/>
+              <a:cs typeface="Arial" panose="020B0604020202020204" pitchFamily="34" charset="0"/>
+            </a:endParaRPr>
+          </a:p>
+        </p:txBody>
+      </p:sp>
+      <mc:AlternateContent xmlns:mc="http://schemas.openxmlformats.org/markup-compatibility/2006" xmlns:a14="http://schemas.microsoft.com/office/drawing/2010/main">
+        <mc:Choice Requires="a14">
+          <p:sp>
+            <p:nvSpPr>
+              <p:cNvPr id="6" name="CuadroTexto 5">
+                <a:extLst>
+                  <a:ext uri="{FF2B5EF4-FFF2-40B4-BE49-F238E27FC236}">
+                    <a16:creationId xmlns:a16="http://schemas.microsoft.com/office/drawing/2014/main" id="{409FBBBB-69CA-B7E5-7176-8227F2788CF5}"/>
+                  </a:ext>
+                </a:extLst>
+              </p:cNvPr>
+              <p:cNvSpPr txBox="1"/>
+              <p:nvPr/>
+            </p:nvSpPr>
+            <p:spPr>
+              <a:xfrm>
+                <a:off x="9941529" y="4179383"/>
+                <a:ext cx="1856534" cy="439608"/>
+              </a:xfrm>
+              <a:prstGeom prst="rect">
+                <a:avLst/>
+              </a:prstGeom>
+              <a:noFill/>
+            </p:spPr>
+            <p:txBody>
+              <a:bodyPr wrap="none" lIns="0" tIns="0" rIns="0" bIns="0" rtlCol="0">
+                <a:spAutoFit/>
+              </a:bodyPr>
+              <a:lstStyle/>
+              <a:p>
+                <a14:m>
+                  <m:oMath xmlns:m="http://schemas.openxmlformats.org/officeDocument/2006/math">
+                    <m:r>
+                      <a:rPr lang="es-ES" sz="1800" b="0" i="1" smtClean="0">
+                        <a:latin typeface="Cambria Math" panose="02040503050406030204" pitchFamily="18" charset="0"/>
+                      </a:rPr>
+                      <m:t>𝛼</m:t>
+                    </m:r>
+                    <m:d>
+                      <m:dPr>
+                        <m:begChr m:val="["/>
+                        <m:endChr m:val="]"/>
+                        <m:ctrlPr>
+                          <a:rPr lang="es-ES" sz="1800" b="0" i="1" smtClean="0">
+                            <a:latin typeface="Cambria Math" panose="02040503050406030204" pitchFamily="18" charset="0"/>
+                          </a:rPr>
+                        </m:ctrlPr>
+                      </m:dPr>
+                      <m:e>
+                        <m:f>
+                          <m:fPr>
+                            <m:ctrlPr>
+                              <a:rPr lang="es-ES" sz="1800" b="0" i="1" smtClean="0">
+                                <a:latin typeface="Cambria Math" panose="02040503050406030204" pitchFamily="18" charset="0"/>
+                              </a:rPr>
+                            </m:ctrlPr>
+                          </m:fPr>
+                          <m:num>
+                            <m:r>
+                              <a:rPr lang="es-ES" sz="1800" b="0" i="1" smtClean="0">
+                                <a:latin typeface="Cambria Math" panose="02040503050406030204" pitchFamily="18" charset="0"/>
+                              </a:rPr>
+                              <m:t>𝑑𝐵</m:t>
+                            </m:r>
+                          </m:num>
+                          <m:den>
+                            <m:r>
+                              <a:rPr lang="es-ES" sz="1800" b="0" i="1" smtClean="0">
+                                <a:latin typeface="Cambria Math" panose="02040503050406030204" pitchFamily="18" charset="0"/>
+                              </a:rPr>
+                              <m:t>90</m:t>
+                            </m:r>
+                            <m:r>
+                              <a:rPr lang="es-ES" sz="1800" b="0" i="1" smtClean="0">
+                                <a:latin typeface="Cambria Math" panose="02040503050406030204" pitchFamily="18" charset="0"/>
+                                <a:ea typeface="Cambria Math" panose="02040503050406030204" pitchFamily="18" charset="0"/>
+                              </a:rPr>
+                              <m:t>°</m:t>
+                            </m:r>
+                          </m:den>
+                        </m:f>
+                      </m:e>
+                    </m:d>
+                    <m:r>
+                      <a:rPr lang="es-ES" sz="1800" b="0" i="1" smtClean="0">
+                        <a:latin typeface="Cambria Math" panose="02040503050406030204" pitchFamily="18" charset="0"/>
+                      </a:rPr>
+                      <m:t>=</m:t>
+                    </m:r>
+                  </m:oMath>
+                </a14:m>
+                <a:r>
+                  <a:rPr lang="es-ES" sz="1800" dirty="0"/>
+                  <a:t> </a:t>
+                </a:r>
+                <a14:m>
+                  <m:oMath xmlns:m="http://schemas.openxmlformats.org/officeDocument/2006/math">
+                    <m:r>
+                      <m:rPr>
+                        <m:sty m:val="p"/>
+                      </m:rPr>
+                      <a:rPr lang="es-ES" sz="1800" b="0" i="0" smtClean="0">
+                        <a:latin typeface="Cambria Math" panose="02040503050406030204" pitchFamily="18" charset="0"/>
+                      </a:rPr>
+                      <m:t>R</m:t>
+                    </m:r>
+                    <m:f>
+                      <m:fPr>
+                        <m:ctrlPr>
+                          <a:rPr lang="es-ES" sz="1800" b="0" i="1" smtClean="0">
+                            <a:latin typeface="Cambria Math" panose="02040503050406030204" pitchFamily="18" charset="0"/>
+                          </a:rPr>
+                        </m:ctrlPr>
+                      </m:fPr>
+                      <m:num>
+                        <m:r>
+                          <a:rPr lang="es-ES" sz="1800" b="0" i="1" smtClean="0">
+                            <a:latin typeface="Cambria Math" panose="02040503050406030204" pitchFamily="18" charset="0"/>
+                          </a:rPr>
+                          <m:t>𝜋</m:t>
+                        </m:r>
+                      </m:num>
+                      <m:den>
+                        <m:r>
+                          <a:rPr lang="es-ES" sz="1800" b="0" i="1" smtClean="0">
+                            <a:latin typeface="Cambria Math" panose="02040503050406030204" pitchFamily="18" charset="0"/>
+                          </a:rPr>
+                          <m:t>2</m:t>
+                        </m:r>
+                      </m:den>
+                    </m:f>
+                    <m:r>
+                      <a:rPr lang="es-ES" sz="1800" i="1">
+                        <a:latin typeface="Cambria Math" panose="02040503050406030204" pitchFamily="18" charset="0"/>
+                      </a:rPr>
+                      <m:t>𝛼</m:t>
+                    </m:r>
+                    <m:d>
+                      <m:dPr>
+                        <m:begChr m:val="["/>
+                        <m:endChr m:val="]"/>
+                        <m:ctrlPr>
+                          <a:rPr lang="es-ES" sz="1800" i="1">
+                            <a:latin typeface="Cambria Math" panose="02040503050406030204" pitchFamily="18" charset="0"/>
+                          </a:rPr>
+                        </m:ctrlPr>
+                      </m:dPr>
+                      <m:e>
+                        <m:f>
+                          <m:fPr>
+                            <m:ctrlPr>
+                              <a:rPr lang="es-ES" sz="1800" i="1">
+                                <a:latin typeface="Cambria Math" panose="02040503050406030204" pitchFamily="18" charset="0"/>
+                              </a:rPr>
+                            </m:ctrlPr>
+                          </m:fPr>
+                          <m:num>
+                            <m:r>
+                              <a:rPr lang="es-ES" sz="1800" i="1">
+                                <a:latin typeface="Cambria Math" panose="02040503050406030204" pitchFamily="18" charset="0"/>
+                              </a:rPr>
+                              <m:t>𝑑𝐵</m:t>
+                            </m:r>
+                          </m:num>
+                          <m:den>
+                            <m:r>
+                              <a:rPr lang="es-ES" sz="1800" i="1">
+                                <a:latin typeface="Cambria Math" panose="02040503050406030204" pitchFamily="18" charset="0"/>
+                              </a:rPr>
+                              <m:t>µ</m:t>
+                            </m:r>
+                            <m:r>
+                              <a:rPr lang="es-ES" sz="1800" i="1">
+                                <a:latin typeface="Cambria Math" panose="02040503050406030204" pitchFamily="18" charset="0"/>
+                              </a:rPr>
+                              <m:t>𝑚</m:t>
+                            </m:r>
+                          </m:den>
+                        </m:f>
+                      </m:e>
+                    </m:d>
+                  </m:oMath>
+                </a14:m>
+                <a:endParaRPr lang="en-US" sz="1800" dirty="0"/>
+              </a:p>
+            </p:txBody>
+          </p:sp>
+        </mc:Choice>
+        <mc:Fallback xmlns="">
+          <p:sp>
+            <p:nvSpPr>
+              <p:cNvPr id="6" name="CuadroTexto 5">
+                <a:extLst>
+                  <a:ext uri="{FF2B5EF4-FFF2-40B4-BE49-F238E27FC236}">
+                    <a16:creationId xmlns:a16="http://schemas.microsoft.com/office/drawing/2014/main" id="{409FBBBB-69CA-B7E5-7176-8227F2788CF5}"/>
+                  </a:ext>
+                </a:extLst>
+              </p:cNvPr>
+              <p:cNvSpPr txBox="1">
+                <a:spLocks noRot="1" noChangeAspect="1" noMove="1" noResize="1" noEditPoints="1" noAdjustHandles="1" noChangeArrowheads="1" noChangeShapeType="1" noTextEdit="1"/>
+              </p:cNvSpPr>
+              <p:nvPr/>
+            </p:nvSpPr>
+            <p:spPr>
+              <a:xfrm>
+                <a:off x="9941529" y="4179383"/>
+                <a:ext cx="1856534" cy="439608"/>
+              </a:xfrm>
+              <a:prstGeom prst="rect">
+                <a:avLst/>
+              </a:prstGeom>
+              <a:blipFill>
+                <a:blip r:embed="rId5"/>
+                <a:stretch>
+                  <a:fillRect l="-3289" b="-13889"/>
+                </a:stretch>
+              </a:blipFill>
+            </p:spPr>
+            <p:txBody>
+              <a:bodyPr/>
+              <a:lstStyle/>
+              <a:p>
+                <a:r>
+                  <a:rPr lang="es-ES">
+                    <a:noFill/>
+                  </a:rPr>
+                  <a:t> </a:t>
+                </a:r>
+              </a:p>
+            </p:txBody>
+          </p:sp>
+        </mc:Fallback>
+      </mc:AlternateContent>
+      <p:sp>
+        <p:nvSpPr>
+          <p:cNvPr id="7" name="Rectángulo 6">
+            <a:extLst>
+              <a:ext uri="{FF2B5EF4-FFF2-40B4-BE49-F238E27FC236}">
+                <a16:creationId xmlns:a16="http://schemas.microsoft.com/office/drawing/2014/main" id="{B5FE8755-B0BF-14B7-64E6-4BBB2560B9A6}"/>
+              </a:ext>
+            </a:extLst>
+          </p:cNvPr>
+          <p:cNvSpPr/>
+          <p:nvPr/>
+        </p:nvSpPr>
+        <p:spPr>
+          <a:xfrm>
+            <a:off x="609441" y="1418373"/>
+            <a:ext cx="11199971" cy="3306028"/>
+          </a:xfrm>
+          <a:prstGeom prst="rect">
+            <a:avLst/>
+          </a:prstGeom>
+          <a:noFill/>
+          <a:ln w="28575">
+            <a:solidFill>
+              <a:srgbClr val="E0700D"/>
+            </a:solidFill>
+          </a:ln>
+        </p:spPr>
+        <p:style>
+          <a:lnRef idx="2">
+            <a:schemeClr val="accent1">
+              <a:shade val="15000"/>
+            </a:schemeClr>
+          </a:lnRef>
+          <a:fillRef idx="1">
+            <a:schemeClr val="accent1"/>
+          </a:fillRef>
+          <a:effectRef idx="0">
+            <a:schemeClr val="accent1"/>
+          </a:effectRef>
+          <a:fontRef idx="minor">
+            <a:schemeClr val="lt1"/>
+          </a:fontRef>
+        </p:style>
+        <p:txBody>
+          <a:bodyPr rtlCol="0" anchor="ctr"/>
+          <a:lstStyle/>
+          <a:p>
+            <a:pPr algn="ctr"/>
+            <a:endParaRPr lang="en-US"/>
+          </a:p>
+        </p:txBody>
+      </p:sp>
+      <p:sp>
+        <p:nvSpPr>
+          <p:cNvPr id="8" name="CuadroTexto 7">
+            <a:extLst>
+              <a:ext uri="{FF2B5EF4-FFF2-40B4-BE49-F238E27FC236}">
+                <a16:creationId xmlns:a16="http://schemas.microsoft.com/office/drawing/2014/main" id="{331EBD86-BA6C-68C9-2D38-FC8CFBA7ADC4}"/>
+              </a:ext>
+            </a:extLst>
+          </p:cNvPr>
+          <p:cNvSpPr txBox="1"/>
+          <p:nvPr/>
+        </p:nvSpPr>
+        <p:spPr>
+          <a:xfrm>
+            <a:off x="2978141" y="2784355"/>
+            <a:ext cx="6235717" cy="923330"/>
+          </a:xfrm>
+          <a:prstGeom prst="rect">
+            <a:avLst/>
+          </a:prstGeom>
+          <a:noFill/>
+        </p:spPr>
+        <p:txBody>
+          <a:bodyPr wrap="square" rtlCol="0">
+            <a:spAutoFit/>
+          </a:bodyPr>
+          <a:lstStyle/>
+          <a:p>
+            <a:pPr algn="ctr"/>
+            <a:r>
+              <a:rPr lang="en-US" b="1" dirty="0"/>
+              <a:t>deep</a:t>
+            </a:r>
+            <a:r>
+              <a:rPr lang="en-US" dirty="0"/>
+              <a:t> waveguide</a:t>
+            </a:r>
+          </a:p>
+          <a:p>
+            <a:pPr algn="ctr"/>
+            <a:endParaRPr lang="en-US" dirty="0"/>
+          </a:p>
+          <a:p>
+            <a:pPr algn="ctr"/>
+            <a:r>
+              <a:rPr lang="en-US" dirty="0"/>
+              <a:t>Paste dB/90º neff_TE0 &amp; neff_TM0 vs R</a:t>
+            </a:r>
+          </a:p>
+        </p:txBody>
+      </p:sp>
+    </p:spTree>
+    <p:extLst>
+      <p:ext uri="{BB962C8B-B14F-4D97-AF65-F5344CB8AC3E}">
+        <p14:creationId xmlns:p14="http://schemas.microsoft.com/office/powerpoint/2010/main" val="3660438245"/>
+      </p:ext>
+    </p:extLst>
+  </p:cSld>
+  <p:clrMapOvr>
+    <a:masterClrMapping/>
+  </p:clrMapOvr>
+</p:sld>
+</file>
+
+<file path=ppt/slides/slide8.xml><?xml version="1.0" encoding="utf-8"?>
+<p:sld xmlns:a="http://schemas.openxmlformats.org/drawingml/2006/main" xmlns:r="http://schemas.openxmlformats.org/officeDocument/2006/relationships" xmlns:p="http://schemas.openxmlformats.org/presentationml/2006/main">
+  <p:cSld>
+    <p:spTree>
+      <p:nvGrpSpPr>
         <p:cNvPr id="1" name=""/>
         <p:cNvGrpSpPr/>
         <p:nvPr/>
@@ -7981,7 +10302,7 @@
           <a:p>
             <a:fld id="{B6F15528-21DE-4FAA-801E-634DDDAF4B2B}" type="slidenum">
               <a:rPr lang="es-ES" smtClean="0"/>
-              <a:t>6</a:t>
+              <a:t>8</a:t>
             </a:fld>
             <a:endParaRPr lang="es-ES"/>
           </a:p>

</xml_diff>